<commit_message>
Included run shell scripts in the Dockerfiles
</commit_message>
<xml_diff>
--- a/doc/Scaling-Options.pptx
+++ b/doc/Scaling-Options.pptx
@@ -5,13 +5,15 @@
     <p:sldMasterId id="2147483648" r:id="rId1"/>
   </p:sldMasterIdLst>
   <p:notesMasterIdLst>
-    <p:notesMasterId r:id="rId6"/>
+    <p:notesMasterId r:id="rId8"/>
   </p:notesMasterIdLst>
   <p:sldIdLst>
     <p:sldId id="256" r:id="rId2"/>
     <p:sldId id="257" r:id="rId3"/>
     <p:sldId id="258" r:id="rId4"/>
     <p:sldId id="259" r:id="rId5"/>
+    <p:sldId id="261" r:id="rId6"/>
+    <p:sldId id="262" r:id="rId7"/>
   </p:sldIdLst>
   <p:sldSz cx="12192000" cy="6858000"/>
   <p:notesSz cx="6858000" cy="9144000"/>
@@ -200,7 +202,7 @@
           <a:p>
             <a:fld id="{72AF268A-710E-DB4F-8C5C-1A06DF99F9F3}" type="datetimeFigureOut">
               <a:rPr lang="en-US" smtClean="0"/>
-              <a:t>9/10/17</a:t>
+              <a:t>9/19/17</a:t>
             </a:fld>
             <a:endParaRPr lang="en-US"/>
           </a:p>
@@ -552,6 +554,174 @@
 </p:notes>
 </file>
 
+<file path=ppt/notesSlides/notesSlide2.xml><?xml version="1.0" encoding="utf-8"?>
+<p:notes xmlns:a="http://schemas.openxmlformats.org/drawingml/2006/main" xmlns:r="http://schemas.openxmlformats.org/officeDocument/2006/relationships" xmlns:p="http://schemas.openxmlformats.org/presentationml/2006/main">
+  <p:cSld>
+    <p:spTree>
+      <p:nvGrpSpPr>
+        <p:cNvPr id="1" name=""/>
+        <p:cNvGrpSpPr/>
+        <p:nvPr/>
+      </p:nvGrpSpPr>
+      <p:grpSpPr>
+        <a:xfrm>
+          <a:off x="0" y="0"/>
+          <a:ext cx="0" cy="0"/>
+          <a:chOff x="0" y="0"/>
+          <a:chExt cx="0" cy="0"/>
+        </a:xfrm>
+      </p:grpSpPr>
+      <p:sp>
+        <p:nvSpPr>
+          <p:cNvPr id="2" name="Slide Image Placeholder 1"/>
+          <p:cNvSpPr>
+            <a:spLocks noGrp="1" noRot="1" noChangeAspect="1"/>
+          </p:cNvSpPr>
+          <p:nvPr>
+            <p:ph type="sldImg"/>
+          </p:nvPr>
+        </p:nvSpPr>
+        <p:spPr/>
+      </p:sp>
+      <p:sp>
+        <p:nvSpPr>
+          <p:cNvPr id="3" name="Notes Placeholder 2"/>
+          <p:cNvSpPr>
+            <a:spLocks noGrp="1"/>
+          </p:cNvSpPr>
+          <p:nvPr>
+            <p:ph type="body" idx="1"/>
+          </p:nvPr>
+        </p:nvSpPr>
+        <p:spPr/>
+        <p:txBody>
+          <a:bodyPr/>
+          <a:lstStyle/>
+          <a:p>
+            <a:endParaRPr lang="en-US" dirty="0"/>
+          </a:p>
+        </p:txBody>
+      </p:sp>
+      <p:sp>
+        <p:nvSpPr>
+          <p:cNvPr id="4" name="Slide Number Placeholder 3"/>
+          <p:cNvSpPr>
+            <a:spLocks noGrp="1"/>
+          </p:cNvSpPr>
+          <p:nvPr>
+            <p:ph type="sldNum" sz="quarter" idx="10"/>
+          </p:nvPr>
+        </p:nvSpPr>
+        <p:spPr/>
+        <p:txBody>
+          <a:bodyPr/>
+          <a:lstStyle/>
+          <a:p>
+            <a:fld id="{1A3887C8-5181-D44F-AF4B-A71D3C38BF83}" type="slidenum">
+              <a:rPr lang="en-US" smtClean="0"/>
+              <a:t>5</a:t>
+            </a:fld>
+            <a:endParaRPr lang="en-US"/>
+          </a:p>
+        </p:txBody>
+      </p:sp>
+    </p:spTree>
+    <p:extLst>
+      <p:ext uri="{BB962C8B-B14F-4D97-AF65-F5344CB8AC3E}">
+        <p14:creationId xmlns:p14="http://schemas.microsoft.com/office/powerpoint/2010/main" val="1157282534"/>
+      </p:ext>
+    </p:extLst>
+  </p:cSld>
+  <p:clrMapOvr>
+    <a:masterClrMapping/>
+  </p:clrMapOvr>
+</p:notes>
+</file>
+
+<file path=ppt/notesSlides/notesSlide3.xml><?xml version="1.0" encoding="utf-8"?>
+<p:notes xmlns:a="http://schemas.openxmlformats.org/drawingml/2006/main" xmlns:r="http://schemas.openxmlformats.org/officeDocument/2006/relationships" xmlns:p="http://schemas.openxmlformats.org/presentationml/2006/main">
+  <p:cSld>
+    <p:spTree>
+      <p:nvGrpSpPr>
+        <p:cNvPr id="1" name=""/>
+        <p:cNvGrpSpPr/>
+        <p:nvPr/>
+      </p:nvGrpSpPr>
+      <p:grpSpPr>
+        <a:xfrm>
+          <a:off x="0" y="0"/>
+          <a:ext cx="0" cy="0"/>
+          <a:chOff x="0" y="0"/>
+          <a:chExt cx="0" cy="0"/>
+        </a:xfrm>
+      </p:grpSpPr>
+      <p:sp>
+        <p:nvSpPr>
+          <p:cNvPr id="2" name="Slide Image Placeholder 1"/>
+          <p:cNvSpPr>
+            <a:spLocks noGrp="1" noRot="1" noChangeAspect="1"/>
+          </p:cNvSpPr>
+          <p:nvPr>
+            <p:ph type="sldImg"/>
+          </p:nvPr>
+        </p:nvSpPr>
+        <p:spPr/>
+      </p:sp>
+      <p:sp>
+        <p:nvSpPr>
+          <p:cNvPr id="3" name="Notes Placeholder 2"/>
+          <p:cNvSpPr>
+            <a:spLocks noGrp="1"/>
+          </p:cNvSpPr>
+          <p:nvPr>
+            <p:ph type="body" idx="1"/>
+          </p:nvPr>
+        </p:nvSpPr>
+        <p:spPr/>
+        <p:txBody>
+          <a:bodyPr/>
+          <a:lstStyle/>
+          <a:p>
+            <a:endParaRPr lang="en-US" dirty="0"/>
+          </a:p>
+        </p:txBody>
+      </p:sp>
+      <p:sp>
+        <p:nvSpPr>
+          <p:cNvPr id="4" name="Slide Number Placeholder 3"/>
+          <p:cNvSpPr>
+            <a:spLocks noGrp="1"/>
+          </p:cNvSpPr>
+          <p:nvPr>
+            <p:ph type="sldNum" sz="quarter" idx="10"/>
+          </p:nvPr>
+        </p:nvSpPr>
+        <p:spPr/>
+        <p:txBody>
+          <a:bodyPr/>
+          <a:lstStyle/>
+          <a:p>
+            <a:fld id="{1A3887C8-5181-D44F-AF4B-A71D3C38BF83}" type="slidenum">
+              <a:rPr lang="en-US" smtClean="0"/>
+              <a:t>6</a:t>
+            </a:fld>
+            <a:endParaRPr lang="en-US"/>
+          </a:p>
+        </p:txBody>
+      </p:sp>
+    </p:spTree>
+    <p:extLst>
+      <p:ext uri="{BB962C8B-B14F-4D97-AF65-F5344CB8AC3E}">
+        <p14:creationId xmlns:p14="http://schemas.microsoft.com/office/powerpoint/2010/main" val="258269362"/>
+      </p:ext>
+    </p:extLst>
+  </p:cSld>
+  <p:clrMapOvr>
+    <a:masterClrMapping/>
+  </p:clrMapOvr>
+</p:notes>
+</file>
+
 <file path=ppt/slideLayouts/slideLayout1.xml><?xml version="1.0" encoding="utf-8"?>
 <p:sldLayout xmlns:a="http://schemas.openxmlformats.org/drawingml/2006/main" xmlns:r="http://schemas.openxmlformats.org/officeDocument/2006/relationships" xmlns:p="http://schemas.openxmlformats.org/presentationml/2006/main" type="title" preserve="1">
   <p:cSld name="Title Slide">
@@ -683,7 +853,7 @@
           <a:p>
             <a:fld id="{AECCA868-EF41-A84C-9350-2AF216974D3E}" type="datetimeFigureOut">
               <a:rPr lang="en-US" smtClean="0"/>
-              <a:t>9/10/17</a:t>
+              <a:t>9/19/17</a:t>
             </a:fld>
             <a:endParaRPr lang="en-US"/>
           </a:p>
@@ -853,7 +1023,7 @@
           <a:p>
             <a:fld id="{AECCA868-EF41-A84C-9350-2AF216974D3E}" type="datetimeFigureOut">
               <a:rPr lang="en-US" smtClean="0"/>
-              <a:t>9/10/17</a:t>
+              <a:t>9/19/17</a:t>
             </a:fld>
             <a:endParaRPr lang="en-US"/>
           </a:p>
@@ -1033,7 +1203,7 @@
           <a:p>
             <a:fld id="{AECCA868-EF41-A84C-9350-2AF216974D3E}" type="datetimeFigureOut">
               <a:rPr lang="en-US" smtClean="0"/>
-              <a:t>9/10/17</a:t>
+              <a:t>9/19/17</a:t>
             </a:fld>
             <a:endParaRPr lang="en-US"/>
           </a:p>
@@ -1203,7 +1373,7 @@
           <a:p>
             <a:fld id="{AECCA868-EF41-A84C-9350-2AF216974D3E}" type="datetimeFigureOut">
               <a:rPr lang="en-US" smtClean="0"/>
-              <a:t>9/10/17</a:t>
+              <a:t>9/19/17</a:t>
             </a:fld>
             <a:endParaRPr lang="en-US"/>
           </a:p>
@@ -1449,7 +1619,7 @@
           <a:p>
             <a:fld id="{AECCA868-EF41-A84C-9350-2AF216974D3E}" type="datetimeFigureOut">
               <a:rPr lang="en-US" smtClean="0"/>
-              <a:t>9/10/17</a:t>
+              <a:t>9/19/17</a:t>
             </a:fld>
             <a:endParaRPr lang="en-US"/>
           </a:p>
@@ -1681,7 +1851,7 @@
           <a:p>
             <a:fld id="{AECCA868-EF41-A84C-9350-2AF216974D3E}" type="datetimeFigureOut">
               <a:rPr lang="en-US" smtClean="0"/>
-              <a:t>9/10/17</a:t>
+              <a:t>9/19/17</a:t>
             </a:fld>
             <a:endParaRPr lang="en-US"/>
           </a:p>
@@ -2048,7 +2218,7 @@
           <a:p>
             <a:fld id="{AECCA868-EF41-A84C-9350-2AF216974D3E}" type="datetimeFigureOut">
               <a:rPr lang="en-US" smtClean="0"/>
-              <a:t>9/10/17</a:t>
+              <a:t>9/19/17</a:t>
             </a:fld>
             <a:endParaRPr lang="en-US"/>
           </a:p>
@@ -2166,7 +2336,7 @@
           <a:p>
             <a:fld id="{AECCA868-EF41-A84C-9350-2AF216974D3E}" type="datetimeFigureOut">
               <a:rPr lang="en-US" smtClean="0"/>
-              <a:t>9/10/17</a:t>
+              <a:t>9/19/17</a:t>
             </a:fld>
             <a:endParaRPr lang="en-US"/>
           </a:p>
@@ -2261,7 +2431,7 @@
           <a:p>
             <a:fld id="{AECCA868-EF41-A84C-9350-2AF216974D3E}" type="datetimeFigureOut">
               <a:rPr lang="en-US" smtClean="0"/>
-              <a:t>9/10/17</a:t>
+              <a:t>9/19/17</a:t>
             </a:fld>
             <a:endParaRPr lang="en-US"/>
           </a:p>
@@ -2538,7 +2708,7 @@
           <a:p>
             <a:fld id="{AECCA868-EF41-A84C-9350-2AF216974D3E}" type="datetimeFigureOut">
               <a:rPr lang="en-US" smtClean="0"/>
-              <a:t>9/10/17</a:t>
+              <a:t>9/19/17</a:t>
             </a:fld>
             <a:endParaRPr lang="en-US"/>
           </a:p>
@@ -2791,7 +2961,7 @@
           <a:p>
             <a:fld id="{AECCA868-EF41-A84C-9350-2AF216974D3E}" type="datetimeFigureOut">
               <a:rPr lang="en-US" smtClean="0"/>
-              <a:t>9/10/17</a:t>
+              <a:t>9/19/17</a:t>
             </a:fld>
             <a:endParaRPr lang="en-US"/>
           </a:p>
@@ -3004,7 +3174,7 @@
           <a:p>
             <a:fld id="{AECCA868-EF41-A84C-9350-2AF216974D3E}" type="datetimeFigureOut">
               <a:rPr lang="en-US" smtClean="0"/>
-              <a:t>9/10/17</a:t>
+              <a:t>9/19/17</a:t>
             </a:fld>
             <a:endParaRPr lang="en-US"/>
           </a:p>
@@ -3457,11 +3627,7 @@
             </a:r>
             <a:r>
               <a:rPr lang="en-US" dirty="0" smtClean="0"/>
-              <a:t> </a:t>
-            </a:r>
-            <a:r>
-              <a:rPr lang="en-US" dirty="0" smtClean="0"/>
-              <a:t>service</a:t>
+              <a:t> service</a:t>
             </a:r>
             <a:endParaRPr lang="en-US" dirty="0"/>
           </a:p>
@@ -3685,7 +3851,6 @@
               <a:rPr lang="en-US" sz="1800" dirty="0"/>
               <a:t>Load balancing and Caching of data at API gateway</a:t>
             </a:r>
-            <a:endParaRPr lang="en-US" sz="1800" dirty="0"/>
           </a:p>
           <a:p>
             <a:r>
@@ -4473,7 +4638,6 @@
               <a:rPr lang="en-US" sz="1800" dirty="0" smtClean="0"/>
               <a:t>Increased latency due to middleware</a:t>
             </a:r>
-            <a:endParaRPr lang="en-US" sz="1800" dirty="0" smtClean="0"/>
           </a:p>
           <a:p>
             <a:pPr lvl="1"/>
@@ -5275,11 +5439,7 @@
             </a:pPr>
             <a:r>
               <a:rPr lang="en-US" sz="1800" dirty="0"/>
-              <a:t>Apache </a:t>
-            </a:r>
-            <a:r>
-              <a:rPr lang="en-US" sz="1800" dirty="0"/>
-              <a:t>Zookeeper, Netflix Eureka</a:t>
+              <a:t>Apache Zookeeper, Netflix Eureka</a:t>
             </a:r>
           </a:p>
           <a:p>
@@ -5301,11 +5461,7 @@
             </a:pPr>
             <a:r>
               <a:rPr lang="en-US" sz="1800" dirty="0"/>
-              <a:t>Apache </a:t>
-            </a:r>
-            <a:r>
-              <a:rPr lang="en-US" sz="1800" dirty="0"/>
-              <a:t>Cassandra, AWS RDS, AWS Dynamo</a:t>
+              <a:t>Apache Cassandra, AWS RDS, AWS Dynamo</a:t>
             </a:r>
           </a:p>
           <a:p>
@@ -5321,7 +5477,6 @@
               <a:rPr lang="en-US" sz="1800" dirty="0"/>
               <a:t>Apache Kafka </a:t>
             </a:r>
-            <a:endParaRPr lang="en-US" sz="1800" dirty="0"/>
           </a:p>
         </p:txBody>
       </p:sp>
@@ -5329,6 +5484,2386 @@
     <p:extLst>
       <p:ext uri="{BB962C8B-B14F-4D97-AF65-F5344CB8AC3E}">
         <p14:creationId xmlns:p14="http://schemas.microsoft.com/office/powerpoint/2010/main" val="222456232"/>
+      </p:ext>
+    </p:extLst>
+  </p:cSld>
+  <p:clrMapOvr>
+    <a:masterClrMapping/>
+  </p:clrMapOvr>
+</p:sld>
+</file>
+
+<file path=ppt/slides/slide5.xml><?xml version="1.0" encoding="utf-8"?>
+<p:sld xmlns:a="http://schemas.openxmlformats.org/drawingml/2006/main" xmlns:r="http://schemas.openxmlformats.org/officeDocument/2006/relationships" xmlns:p="http://schemas.openxmlformats.org/presentationml/2006/main">
+  <p:cSld>
+    <p:spTree>
+      <p:nvGrpSpPr>
+        <p:cNvPr id="1" name=""/>
+        <p:cNvGrpSpPr/>
+        <p:nvPr/>
+      </p:nvGrpSpPr>
+      <p:grpSpPr>
+        <a:xfrm>
+          <a:off x="0" y="0"/>
+          <a:ext cx="0" cy="0"/>
+          <a:chOff x="0" y="0"/>
+          <a:chExt cx="0" cy="0"/>
+        </a:xfrm>
+      </p:grpSpPr>
+      <p:sp>
+        <p:nvSpPr>
+          <p:cNvPr id="2" name="Title 1"/>
+          <p:cNvSpPr>
+            <a:spLocks noGrp="1"/>
+          </p:cNvSpPr>
+          <p:nvPr>
+            <p:ph type="title"/>
+          </p:nvPr>
+        </p:nvSpPr>
+        <p:spPr>
+          <a:xfrm>
+            <a:off x="838200" y="365125"/>
+            <a:ext cx="10515600" cy="729749"/>
+          </a:xfrm>
+        </p:spPr>
+        <p:txBody>
+          <a:bodyPr>
+            <a:normAutofit/>
+          </a:bodyPr>
+          <a:lstStyle/>
+          <a:p>
+            <a:r>
+              <a:rPr lang="en-US" sz="2500" dirty="0" smtClean="0"/>
+              <a:t>SOLUTION </a:t>
+            </a:r>
+            <a:r>
+              <a:rPr lang="mr-IN" sz="2500" dirty="0" smtClean="0"/>
+              <a:t>–</a:t>
+            </a:r>
+            <a:r>
+              <a:rPr lang="en-US" sz="2500" dirty="0" smtClean="0"/>
+              <a:t> API gateway</a:t>
+            </a:r>
+            <a:endParaRPr lang="en-US" sz="2500" dirty="0"/>
+          </a:p>
+        </p:txBody>
+      </p:sp>
+      <p:sp>
+        <p:nvSpPr>
+          <p:cNvPr id="4" name="Rectangle 3"/>
+          <p:cNvSpPr/>
+          <p:nvPr/>
+        </p:nvSpPr>
+        <p:spPr>
+          <a:xfrm>
+            <a:off x="1885942" y="2014537"/>
+            <a:ext cx="1085850" cy="573755"/>
+          </a:xfrm>
+          <a:prstGeom prst="rect">
+            <a:avLst/>
+          </a:prstGeom>
+        </p:spPr>
+        <p:style>
+          <a:lnRef idx="2">
+            <a:schemeClr val="accent1">
+              <a:shade val="50000"/>
+            </a:schemeClr>
+          </a:lnRef>
+          <a:fillRef idx="1">
+            <a:schemeClr val="accent1"/>
+          </a:fillRef>
+          <a:effectRef idx="0">
+            <a:schemeClr val="accent1"/>
+          </a:effectRef>
+          <a:fontRef idx="minor">
+            <a:schemeClr val="lt1"/>
+          </a:fontRef>
+        </p:style>
+        <p:txBody>
+          <a:bodyPr rtlCol="0" anchor="ctr"/>
+          <a:lstStyle/>
+          <a:p>
+            <a:pPr algn="ctr"/>
+            <a:r>
+              <a:rPr lang="en-US" dirty="0" err="1" smtClean="0"/>
+              <a:t>Zuul</a:t>
+            </a:r>
+            <a:endParaRPr lang="en-US" dirty="0"/>
+          </a:p>
+        </p:txBody>
+      </p:sp>
+      <p:sp>
+        <p:nvSpPr>
+          <p:cNvPr id="7" name="Triangle 6"/>
+          <p:cNvSpPr/>
+          <p:nvPr/>
+        </p:nvSpPr>
+        <p:spPr>
+          <a:xfrm>
+            <a:off x="357174" y="3635918"/>
+            <a:ext cx="1243013" cy="802355"/>
+          </a:xfrm>
+          <a:prstGeom prst="triangle">
+            <a:avLst/>
+          </a:prstGeom>
+        </p:spPr>
+        <p:style>
+          <a:lnRef idx="2">
+            <a:schemeClr val="dk1">
+              <a:shade val="50000"/>
+            </a:schemeClr>
+          </a:lnRef>
+          <a:fillRef idx="1">
+            <a:schemeClr val="dk1"/>
+          </a:fillRef>
+          <a:effectRef idx="0">
+            <a:schemeClr val="dk1"/>
+          </a:effectRef>
+          <a:fontRef idx="minor">
+            <a:schemeClr val="lt1"/>
+          </a:fontRef>
+        </p:style>
+        <p:txBody>
+          <a:bodyPr rtlCol="0" anchor="ctr"/>
+          <a:lstStyle/>
+          <a:p>
+            <a:pPr algn="ctr"/>
+            <a:r>
+              <a:rPr lang="en-US" sz="1000" dirty="0" smtClean="0"/>
+              <a:t>Hash </a:t>
+            </a:r>
+            <a:r>
+              <a:rPr lang="en-US" sz="1000" dirty="0" err="1" smtClean="0"/>
+              <a:t>Dehash</a:t>
+            </a:r>
+            <a:r>
+              <a:rPr lang="en-US" sz="1000" dirty="0" smtClean="0"/>
+              <a:t> 1</a:t>
+            </a:r>
+            <a:endParaRPr lang="en-US" sz="1000" dirty="0"/>
+          </a:p>
+        </p:txBody>
+      </p:sp>
+      <p:sp>
+        <p:nvSpPr>
+          <p:cNvPr id="10" name="Content Placeholder 9"/>
+          <p:cNvSpPr>
+            <a:spLocks noGrp="1"/>
+          </p:cNvSpPr>
+          <p:nvPr>
+            <p:ph idx="1"/>
+          </p:nvPr>
+        </p:nvSpPr>
+        <p:spPr>
+          <a:xfrm>
+            <a:off x="5986463" y="1094873"/>
+            <a:ext cx="5367336" cy="4720139"/>
+          </a:xfrm>
+        </p:spPr>
+        <p:txBody>
+          <a:bodyPr>
+            <a:normAutofit fontScale="92500" lnSpcReduction="20000"/>
+          </a:bodyPr>
+          <a:lstStyle/>
+          <a:p>
+            <a:r>
+              <a:rPr lang="en-US" dirty="0" smtClean="0"/>
+              <a:t>The service instances register with Eureka (discovery server) on startup</a:t>
+            </a:r>
+          </a:p>
+          <a:p>
+            <a:r>
+              <a:rPr lang="en-US" dirty="0" smtClean="0"/>
+              <a:t>Eureka also does a heart beat / health check of all registered instances at set intervals</a:t>
+            </a:r>
+          </a:p>
+          <a:p>
+            <a:r>
+              <a:rPr lang="en-US" dirty="0" smtClean="0"/>
+              <a:t>Flow</a:t>
+            </a:r>
+          </a:p>
+          <a:p>
+            <a:pPr lvl="1"/>
+            <a:r>
+              <a:rPr lang="en-US" dirty="0" smtClean="0"/>
+              <a:t>The Client will invoke the </a:t>
+            </a:r>
+            <a:r>
+              <a:rPr lang="en-US" dirty="0" err="1" smtClean="0"/>
+              <a:t>Zuul</a:t>
+            </a:r>
+            <a:r>
+              <a:rPr lang="en-US" dirty="0" smtClean="0"/>
+              <a:t> proxy thru a URL.</a:t>
+            </a:r>
+          </a:p>
+          <a:p>
+            <a:pPr lvl="1"/>
+            <a:r>
+              <a:rPr lang="en-US" dirty="0" smtClean="0"/>
+              <a:t>Based on the routes, </a:t>
+            </a:r>
+            <a:r>
+              <a:rPr lang="en-US" dirty="0" err="1" smtClean="0"/>
+              <a:t>Zuul</a:t>
+            </a:r>
+            <a:r>
+              <a:rPr lang="en-US" dirty="0" smtClean="0"/>
+              <a:t> will lookup Eureka to obtain the service URL</a:t>
+            </a:r>
+          </a:p>
+          <a:p>
+            <a:pPr lvl="1"/>
+            <a:r>
+              <a:rPr lang="en-US" dirty="0" err="1" smtClean="0"/>
+              <a:t>Zuul</a:t>
+            </a:r>
+            <a:r>
+              <a:rPr lang="en-US" dirty="0" smtClean="0"/>
+              <a:t> will invoke the service with the URL</a:t>
+            </a:r>
+          </a:p>
+          <a:p>
+            <a:pPr lvl="1"/>
+            <a:r>
+              <a:rPr lang="en-US" dirty="0" smtClean="0"/>
+              <a:t>The service instances are stateless and will obtain the data from the </a:t>
+            </a:r>
+            <a:r>
+              <a:rPr lang="en-US" dirty="0" err="1" smtClean="0"/>
+              <a:t>cassandra</a:t>
+            </a:r>
+            <a:r>
+              <a:rPr lang="en-US" dirty="0" smtClean="0"/>
+              <a:t> cluster</a:t>
+            </a:r>
+          </a:p>
+          <a:p>
+            <a:pPr lvl="1"/>
+            <a:endParaRPr lang="en-US" sz="2000" dirty="0"/>
+          </a:p>
+        </p:txBody>
+      </p:sp>
+      <p:sp>
+        <p:nvSpPr>
+          <p:cNvPr id="13" name="Triangle 12"/>
+          <p:cNvSpPr/>
+          <p:nvPr/>
+        </p:nvSpPr>
+        <p:spPr>
+          <a:xfrm>
+            <a:off x="1921658" y="3635918"/>
+            <a:ext cx="1243013" cy="802355"/>
+          </a:xfrm>
+          <a:prstGeom prst="triangle">
+            <a:avLst/>
+          </a:prstGeom>
+        </p:spPr>
+        <p:style>
+          <a:lnRef idx="2">
+            <a:schemeClr val="dk1">
+              <a:shade val="50000"/>
+            </a:schemeClr>
+          </a:lnRef>
+          <a:fillRef idx="1">
+            <a:schemeClr val="dk1"/>
+          </a:fillRef>
+          <a:effectRef idx="0">
+            <a:schemeClr val="dk1"/>
+          </a:effectRef>
+          <a:fontRef idx="minor">
+            <a:schemeClr val="lt1"/>
+          </a:fontRef>
+        </p:style>
+        <p:txBody>
+          <a:bodyPr rtlCol="0" anchor="ctr"/>
+          <a:lstStyle/>
+          <a:p>
+            <a:pPr algn="ctr"/>
+            <a:r>
+              <a:rPr lang="en-US" sz="1000" dirty="0" smtClean="0"/>
+              <a:t>Hash </a:t>
+            </a:r>
+            <a:r>
+              <a:rPr lang="en-US" sz="1000" dirty="0" err="1" smtClean="0"/>
+              <a:t>Dehash</a:t>
+            </a:r>
+            <a:r>
+              <a:rPr lang="en-US" sz="1000" dirty="0" smtClean="0"/>
+              <a:t> 2</a:t>
+            </a:r>
+            <a:endParaRPr lang="en-US" sz="1000" dirty="0"/>
+          </a:p>
+        </p:txBody>
+      </p:sp>
+      <p:sp>
+        <p:nvSpPr>
+          <p:cNvPr id="14" name="Triangle 13"/>
+          <p:cNvSpPr/>
+          <p:nvPr/>
+        </p:nvSpPr>
+        <p:spPr>
+          <a:xfrm>
+            <a:off x="3374226" y="3659726"/>
+            <a:ext cx="1243013" cy="802355"/>
+          </a:xfrm>
+          <a:prstGeom prst="triangle">
+            <a:avLst/>
+          </a:prstGeom>
+        </p:spPr>
+        <p:style>
+          <a:lnRef idx="2">
+            <a:schemeClr val="dk1">
+              <a:shade val="50000"/>
+            </a:schemeClr>
+          </a:lnRef>
+          <a:fillRef idx="1">
+            <a:schemeClr val="dk1"/>
+          </a:fillRef>
+          <a:effectRef idx="0">
+            <a:schemeClr val="dk1"/>
+          </a:effectRef>
+          <a:fontRef idx="minor">
+            <a:schemeClr val="lt1"/>
+          </a:fontRef>
+        </p:style>
+        <p:txBody>
+          <a:bodyPr rtlCol="0" anchor="ctr"/>
+          <a:lstStyle/>
+          <a:p>
+            <a:pPr algn="ctr"/>
+            <a:r>
+              <a:rPr lang="en-US" sz="1000" dirty="0" smtClean="0"/>
+              <a:t>Hash </a:t>
+            </a:r>
+            <a:r>
+              <a:rPr lang="en-US" sz="1000" dirty="0" err="1" smtClean="0"/>
+              <a:t>Dehash</a:t>
+            </a:r>
+            <a:r>
+              <a:rPr lang="en-US" sz="1000" dirty="0" smtClean="0"/>
+              <a:t> 3</a:t>
+            </a:r>
+            <a:endParaRPr lang="en-US" sz="1000" dirty="0"/>
+          </a:p>
+        </p:txBody>
+      </p:sp>
+      <p:sp>
+        <p:nvSpPr>
+          <p:cNvPr id="16" name="Oval 15"/>
+          <p:cNvSpPr/>
+          <p:nvPr/>
+        </p:nvSpPr>
+        <p:spPr>
+          <a:xfrm>
+            <a:off x="4758920" y="2382838"/>
+            <a:ext cx="1193014" cy="762667"/>
+          </a:xfrm>
+          <a:prstGeom prst="ellipse">
+            <a:avLst/>
+          </a:prstGeom>
+        </p:spPr>
+        <p:style>
+          <a:lnRef idx="2">
+            <a:schemeClr val="accent1">
+              <a:shade val="50000"/>
+            </a:schemeClr>
+          </a:lnRef>
+          <a:fillRef idx="1">
+            <a:schemeClr val="accent1"/>
+          </a:fillRef>
+          <a:effectRef idx="0">
+            <a:schemeClr val="accent1"/>
+          </a:effectRef>
+          <a:fontRef idx="minor">
+            <a:schemeClr val="lt1"/>
+          </a:fontRef>
+        </p:style>
+        <p:txBody>
+          <a:bodyPr rtlCol="0" anchor="ctr"/>
+          <a:lstStyle/>
+          <a:p>
+            <a:pPr algn="ctr"/>
+            <a:r>
+              <a:rPr lang="en-US" dirty="0"/>
+              <a:t>Eureka</a:t>
+            </a:r>
+            <a:endParaRPr lang="en-US" dirty="0"/>
+          </a:p>
+        </p:txBody>
+      </p:sp>
+      <p:cxnSp>
+        <p:nvCxnSpPr>
+          <p:cNvPr id="18" name="Straight Arrow Connector 17"/>
+          <p:cNvCxnSpPr>
+            <a:endCxn id="7" idx="0"/>
+          </p:cNvCxnSpPr>
+          <p:nvPr/>
+        </p:nvCxnSpPr>
+        <p:spPr>
+          <a:xfrm flipH="1">
+            <a:off x="978681" y="2511431"/>
+            <a:ext cx="964414" cy="1124487"/>
+          </a:xfrm>
+          <a:prstGeom prst="straightConnector1">
+            <a:avLst/>
+          </a:prstGeom>
+          <a:ln>
+            <a:tailEnd type="triangle"/>
+          </a:ln>
+        </p:spPr>
+        <p:style>
+          <a:lnRef idx="1">
+            <a:schemeClr val="accent1"/>
+          </a:lnRef>
+          <a:fillRef idx="0">
+            <a:schemeClr val="accent1"/>
+          </a:fillRef>
+          <a:effectRef idx="0">
+            <a:schemeClr val="accent1"/>
+          </a:effectRef>
+          <a:fontRef idx="minor">
+            <a:schemeClr val="tx1"/>
+          </a:fontRef>
+        </p:style>
+      </p:cxnSp>
+      <p:cxnSp>
+        <p:nvCxnSpPr>
+          <p:cNvPr id="20" name="Straight Arrow Connector 19"/>
+          <p:cNvCxnSpPr>
+            <a:stCxn id="4" idx="2"/>
+            <a:endCxn id="13" idx="0"/>
+          </p:cNvCxnSpPr>
+          <p:nvPr/>
+        </p:nvCxnSpPr>
+        <p:spPr>
+          <a:xfrm>
+            <a:off x="2428867" y="2588292"/>
+            <a:ext cx="114298" cy="1047626"/>
+          </a:xfrm>
+          <a:prstGeom prst="straightConnector1">
+            <a:avLst/>
+          </a:prstGeom>
+          <a:ln>
+            <a:tailEnd type="triangle"/>
+          </a:ln>
+        </p:spPr>
+        <p:style>
+          <a:lnRef idx="1">
+            <a:schemeClr val="accent1"/>
+          </a:lnRef>
+          <a:fillRef idx="0">
+            <a:schemeClr val="accent1"/>
+          </a:fillRef>
+          <a:effectRef idx="0">
+            <a:schemeClr val="accent1"/>
+          </a:effectRef>
+          <a:fontRef idx="minor">
+            <a:schemeClr val="tx1"/>
+          </a:fontRef>
+        </p:style>
+      </p:cxnSp>
+      <p:cxnSp>
+        <p:nvCxnSpPr>
+          <p:cNvPr id="22" name="Straight Arrow Connector 21"/>
+          <p:cNvCxnSpPr>
+            <a:endCxn id="14" idx="0"/>
+          </p:cNvCxnSpPr>
+          <p:nvPr/>
+        </p:nvCxnSpPr>
+        <p:spPr>
+          <a:xfrm>
+            <a:off x="2850356" y="2588292"/>
+            <a:ext cx="1145377" cy="1071434"/>
+          </a:xfrm>
+          <a:prstGeom prst="straightConnector1">
+            <a:avLst/>
+          </a:prstGeom>
+          <a:ln>
+            <a:tailEnd type="triangle"/>
+          </a:ln>
+        </p:spPr>
+        <p:style>
+          <a:lnRef idx="1">
+            <a:schemeClr val="accent1"/>
+          </a:lnRef>
+          <a:fillRef idx="0">
+            <a:schemeClr val="accent1"/>
+          </a:fillRef>
+          <a:effectRef idx="0">
+            <a:schemeClr val="accent1"/>
+          </a:effectRef>
+          <a:fontRef idx="minor">
+            <a:schemeClr val="tx1"/>
+          </a:fontRef>
+        </p:style>
+      </p:cxnSp>
+      <p:sp>
+        <p:nvSpPr>
+          <p:cNvPr id="23" name="Rectangle 22"/>
+          <p:cNvSpPr/>
+          <p:nvPr/>
+        </p:nvSpPr>
+        <p:spPr>
+          <a:xfrm>
+            <a:off x="1171575" y="3045490"/>
+            <a:ext cx="2414588" cy="169198"/>
+          </a:xfrm>
+          <a:prstGeom prst="rect">
+            <a:avLst/>
+          </a:prstGeom>
+          <a:gradFill>
+            <a:gsLst>
+              <a:gs pos="0">
+                <a:schemeClr val="accent1">
+                  <a:lumMod val="5000"/>
+                  <a:lumOff val="95000"/>
+                </a:schemeClr>
+              </a:gs>
+              <a:gs pos="74000">
+                <a:schemeClr val="accent1">
+                  <a:lumMod val="45000"/>
+                  <a:lumOff val="55000"/>
+                </a:schemeClr>
+              </a:gs>
+              <a:gs pos="83000">
+                <a:schemeClr val="accent1">
+                  <a:lumMod val="45000"/>
+                  <a:lumOff val="55000"/>
+                </a:schemeClr>
+              </a:gs>
+              <a:gs pos="100000">
+                <a:schemeClr val="accent1">
+                  <a:lumMod val="30000"/>
+                  <a:lumOff val="70000"/>
+                </a:schemeClr>
+              </a:gs>
+            </a:gsLst>
+            <a:lin ang="5400000" scaled="1"/>
+          </a:gradFill>
+        </p:spPr>
+        <p:style>
+          <a:lnRef idx="2">
+            <a:schemeClr val="accent1">
+              <a:shade val="50000"/>
+            </a:schemeClr>
+          </a:lnRef>
+          <a:fillRef idx="1">
+            <a:schemeClr val="accent1"/>
+          </a:fillRef>
+          <a:effectRef idx="0">
+            <a:schemeClr val="accent1"/>
+          </a:effectRef>
+          <a:fontRef idx="minor">
+            <a:schemeClr val="lt1"/>
+          </a:fontRef>
+        </p:style>
+        <p:txBody>
+          <a:bodyPr rtlCol="0" anchor="ctr"/>
+          <a:lstStyle/>
+          <a:p>
+            <a:pPr algn="ctr"/>
+            <a:r>
+              <a:rPr lang="en-US" dirty="0" smtClean="0"/>
+              <a:t>REST</a:t>
+            </a:r>
+            <a:endParaRPr lang="en-US" dirty="0"/>
+          </a:p>
+        </p:txBody>
+      </p:sp>
+      <p:sp>
+        <p:nvSpPr>
+          <p:cNvPr id="19" name="Can 18"/>
+          <p:cNvSpPr/>
+          <p:nvPr/>
+        </p:nvSpPr>
+        <p:spPr>
+          <a:xfrm>
+            <a:off x="2093110" y="4986337"/>
+            <a:ext cx="878682" cy="716629"/>
+          </a:xfrm>
+          <a:prstGeom prst="can">
+            <a:avLst/>
+          </a:prstGeom>
+          <a:gradFill flip="none" rotWithShape="1">
+            <a:gsLst>
+              <a:gs pos="0">
+                <a:srgbClr val="92D050">
+                  <a:shade val="30000"/>
+                  <a:satMod val="115000"/>
+                </a:srgbClr>
+              </a:gs>
+              <a:gs pos="50000">
+                <a:srgbClr val="92D050">
+                  <a:shade val="67500"/>
+                  <a:satMod val="115000"/>
+                </a:srgbClr>
+              </a:gs>
+              <a:gs pos="100000">
+                <a:srgbClr val="92D050">
+                  <a:shade val="100000"/>
+                  <a:satMod val="115000"/>
+                </a:srgbClr>
+              </a:gs>
+            </a:gsLst>
+            <a:path path="circle">
+              <a:fillToRect l="50000" t="50000" r="50000" b="50000"/>
+            </a:path>
+            <a:tileRect/>
+          </a:gradFill>
+        </p:spPr>
+        <p:style>
+          <a:lnRef idx="2">
+            <a:schemeClr val="accent1">
+              <a:shade val="50000"/>
+            </a:schemeClr>
+          </a:lnRef>
+          <a:fillRef idx="1">
+            <a:schemeClr val="accent1"/>
+          </a:fillRef>
+          <a:effectRef idx="0">
+            <a:schemeClr val="accent1"/>
+          </a:effectRef>
+          <a:fontRef idx="minor">
+            <a:schemeClr val="lt1"/>
+          </a:fontRef>
+        </p:style>
+        <p:txBody>
+          <a:bodyPr vert="horz" rtlCol="0" anchor="ctr"/>
+          <a:lstStyle/>
+          <a:p>
+            <a:pPr algn="ctr"/>
+            <a:r>
+              <a:rPr lang="en-US" sz="1200" dirty="0" smtClean="0"/>
+              <a:t>DB</a:t>
+            </a:r>
+            <a:endParaRPr lang="en-US" sz="1200" dirty="0"/>
+          </a:p>
+        </p:txBody>
+      </p:sp>
+      <p:cxnSp>
+        <p:nvCxnSpPr>
+          <p:cNvPr id="5" name="Straight Arrow Connector 4"/>
+          <p:cNvCxnSpPr>
+            <a:stCxn id="7" idx="3"/>
+            <a:endCxn id="19" idx="1"/>
+          </p:cNvCxnSpPr>
+          <p:nvPr/>
+        </p:nvCxnSpPr>
+        <p:spPr>
+          <a:xfrm>
+            <a:off x="978681" y="4438273"/>
+            <a:ext cx="1553770" cy="548064"/>
+          </a:xfrm>
+          <a:prstGeom prst="straightConnector1">
+            <a:avLst/>
+          </a:prstGeom>
+          <a:ln>
+            <a:tailEnd type="triangle"/>
+          </a:ln>
+        </p:spPr>
+        <p:style>
+          <a:lnRef idx="1">
+            <a:schemeClr val="accent1"/>
+          </a:lnRef>
+          <a:fillRef idx="0">
+            <a:schemeClr val="accent1"/>
+          </a:fillRef>
+          <a:effectRef idx="0">
+            <a:schemeClr val="accent1"/>
+          </a:effectRef>
+          <a:fontRef idx="minor">
+            <a:schemeClr val="tx1"/>
+          </a:fontRef>
+        </p:style>
+      </p:cxnSp>
+      <p:cxnSp>
+        <p:nvCxnSpPr>
+          <p:cNvPr id="8" name="Straight Arrow Connector 7"/>
+          <p:cNvCxnSpPr>
+            <a:stCxn id="13" idx="3"/>
+            <a:endCxn id="19" idx="1"/>
+          </p:cNvCxnSpPr>
+          <p:nvPr/>
+        </p:nvCxnSpPr>
+        <p:spPr>
+          <a:xfrm flipH="1">
+            <a:off x="2532451" y="4438273"/>
+            <a:ext cx="10714" cy="548064"/>
+          </a:xfrm>
+          <a:prstGeom prst="straightConnector1">
+            <a:avLst/>
+          </a:prstGeom>
+          <a:ln>
+            <a:tailEnd type="triangle"/>
+          </a:ln>
+        </p:spPr>
+        <p:style>
+          <a:lnRef idx="1">
+            <a:schemeClr val="accent1"/>
+          </a:lnRef>
+          <a:fillRef idx="0">
+            <a:schemeClr val="accent1"/>
+          </a:fillRef>
+          <a:effectRef idx="0">
+            <a:schemeClr val="accent1"/>
+          </a:effectRef>
+          <a:fontRef idx="minor">
+            <a:schemeClr val="tx1"/>
+          </a:fontRef>
+        </p:style>
+      </p:cxnSp>
+      <p:cxnSp>
+        <p:nvCxnSpPr>
+          <p:cNvPr id="11" name="Straight Arrow Connector 10"/>
+          <p:cNvCxnSpPr>
+            <a:stCxn id="14" idx="3"/>
+            <a:endCxn id="19" idx="1"/>
+          </p:cNvCxnSpPr>
+          <p:nvPr/>
+        </p:nvCxnSpPr>
+        <p:spPr>
+          <a:xfrm flipH="1">
+            <a:off x="2532451" y="4462081"/>
+            <a:ext cx="1463282" cy="524256"/>
+          </a:xfrm>
+          <a:prstGeom prst="straightConnector1">
+            <a:avLst/>
+          </a:prstGeom>
+          <a:ln>
+            <a:tailEnd type="triangle"/>
+          </a:ln>
+        </p:spPr>
+        <p:style>
+          <a:lnRef idx="1">
+            <a:schemeClr val="accent1"/>
+          </a:lnRef>
+          <a:fillRef idx="0">
+            <a:schemeClr val="accent1"/>
+          </a:fillRef>
+          <a:effectRef idx="0">
+            <a:schemeClr val="accent1"/>
+          </a:effectRef>
+          <a:fontRef idx="minor">
+            <a:schemeClr val="tx1"/>
+          </a:fontRef>
+        </p:style>
+      </p:cxnSp>
+      <p:sp>
+        <p:nvSpPr>
+          <p:cNvPr id="17" name="Can 16"/>
+          <p:cNvSpPr/>
+          <p:nvPr/>
+        </p:nvSpPr>
+        <p:spPr>
+          <a:xfrm>
+            <a:off x="2214545" y="5129336"/>
+            <a:ext cx="950126" cy="719078"/>
+          </a:xfrm>
+          <a:prstGeom prst="can">
+            <a:avLst/>
+          </a:prstGeom>
+          <a:gradFill flip="none" rotWithShape="1">
+            <a:gsLst>
+              <a:gs pos="0">
+                <a:srgbClr val="92D050">
+                  <a:shade val="30000"/>
+                  <a:satMod val="115000"/>
+                </a:srgbClr>
+              </a:gs>
+              <a:gs pos="50000">
+                <a:srgbClr val="92D050">
+                  <a:shade val="67500"/>
+                  <a:satMod val="115000"/>
+                </a:srgbClr>
+              </a:gs>
+              <a:gs pos="100000">
+                <a:srgbClr val="92D050">
+                  <a:shade val="100000"/>
+                  <a:satMod val="115000"/>
+                </a:srgbClr>
+              </a:gs>
+            </a:gsLst>
+            <a:path path="circle">
+              <a:fillToRect l="50000" t="50000" r="50000" b="50000"/>
+            </a:path>
+            <a:tileRect/>
+          </a:gradFill>
+        </p:spPr>
+        <p:style>
+          <a:lnRef idx="2">
+            <a:schemeClr val="accent1">
+              <a:shade val="50000"/>
+            </a:schemeClr>
+          </a:lnRef>
+          <a:fillRef idx="1">
+            <a:schemeClr val="accent1"/>
+          </a:fillRef>
+          <a:effectRef idx="0">
+            <a:schemeClr val="accent1"/>
+          </a:effectRef>
+          <a:fontRef idx="minor">
+            <a:schemeClr val="lt1"/>
+          </a:fontRef>
+        </p:style>
+        <p:txBody>
+          <a:bodyPr vert="horz" rtlCol="0" anchor="ctr"/>
+          <a:lstStyle/>
+          <a:p>
+            <a:pPr algn="ctr"/>
+            <a:r>
+              <a:rPr lang="en-US" sz="1200" smtClean="0"/>
+              <a:t>Cassandra</a:t>
+            </a:r>
+            <a:endParaRPr lang="en-US" sz="1200" dirty="0"/>
+          </a:p>
+        </p:txBody>
+      </p:sp>
+      <p:cxnSp>
+        <p:nvCxnSpPr>
+          <p:cNvPr id="15" name="Straight Arrow Connector 14"/>
+          <p:cNvCxnSpPr>
+            <a:stCxn id="4" idx="3"/>
+            <a:endCxn id="16" idx="2"/>
+          </p:cNvCxnSpPr>
+          <p:nvPr/>
+        </p:nvCxnSpPr>
+        <p:spPr>
+          <a:xfrm>
+            <a:off x="2971792" y="2301415"/>
+            <a:ext cx="1787128" cy="462757"/>
+          </a:xfrm>
+          <a:prstGeom prst="straightConnector1">
+            <a:avLst/>
+          </a:prstGeom>
+          <a:ln>
+            <a:headEnd type="triangle"/>
+            <a:tailEnd type="triangle"/>
+          </a:ln>
+        </p:spPr>
+        <p:style>
+          <a:lnRef idx="1">
+            <a:schemeClr val="accent1"/>
+          </a:lnRef>
+          <a:fillRef idx="0">
+            <a:schemeClr val="accent1"/>
+          </a:fillRef>
+          <a:effectRef idx="0">
+            <a:schemeClr val="accent1"/>
+          </a:effectRef>
+          <a:fontRef idx="minor">
+            <a:schemeClr val="tx1"/>
+          </a:fontRef>
+        </p:style>
+      </p:cxnSp>
+      <p:cxnSp>
+        <p:nvCxnSpPr>
+          <p:cNvPr id="26" name="Straight Arrow Connector 25"/>
+          <p:cNvCxnSpPr>
+            <a:endCxn id="16" idx="3"/>
+          </p:cNvCxnSpPr>
+          <p:nvPr/>
+        </p:nvCxnSpPr>
+        <p:spPr>
+          <a:xfrm flipV="1">
+            <a:off x="1264436" y="3033815"/>
+            <a:ext cx="3669197" cy="842441"/>
+          </a:xfrm>
+          <a:prstGeom prst="straightConnector1">
+            <a:avLst/>
+          </a:prstGeom>
+          <a:ln>
+            <a:solidFill>
+              <a:schemeClr val="accent1"/>
+            </a:solidFill>
+            <a:prstDash val="dash"/>
+            <a:tailEnd type="triangle"/>
+          </a:ln>
+        </p:spPr>
+        <p:style>
+          <a:lnRef idx="1">
+            <a:schemeClr val="accent1"/>
+          </a:lnRef>
+          <a:fillRef idx="0">
+            <a:schemeClr val="accent1"/>
+          </a:fillRef>
+          <a:effectRef idx="0">
+            <a:schemeClr val="accent1"/>
+          </a:effectRef>
+          <a:fontRef idx="minor">
+            <a:schemeClr val="tx1"/>
+          </a:fontRef>
+        </p:style>
+      </p:cxnSp>
+      <p:cxnSp>
+        <p:nvCxnSpPr>
+          <p:cNvPr id="27" name="Straight Arrow Connector 26"/>
+          <p:cNvCxnSpPr>
+            <a:stCxn id="13" idx="5"/>
+          </p:cNvCxnSpPr>
+          <p:nvPr/>
+        </p:nvCxnSpPr>
+        <p:spPr>
+          <a:xfrm flipV="1">
+            <a:off x="2853918" y="3120940"/>
+            <a:ext cx="2262632" cy="916156"/>
+          </a:xfrm>
+          <a:prstGeom prst="straightConnector1">
+            <a:avLst/>
+          </a:prstGeom>
+          <a:ln>
+            <a:solidFill>
+              <a:schemeClr val="accent1"/>
+            </a:solidFill>
+            <a:prstDash val="dash"/>
+            <a:tailEnd type="triangle"/>
+          </a:ln>
+        </p:spPr>
+        <p:style>
+          <a:lnRef idx="1">
+            <a:schemeClr val="accent1"/>
+          </a:lnRef>
+          <a:fillRef idx="0">
+            <a:schemeClr val="accent1"/>
+          </a:fillRef>
+          <a:effectRef idx="0">
+            <a:schemeClr val="accent1"/>
+          </a:effectRef>
+          <a:fontRef idx="minor">
+            <a:schemeClr val="tx1"/>
+          </a:fontRef>
+        </p:style>
+      </p:cxnSp>
+      <p:cxnSp>
+        <p:nvCxnSpPr>
+          <p:cNvPr id="31" name="Straight Arrow Connector 30"/>
+          <p:cNvCxnSpPr>
+            <a:stCxn id="14" idx="5"/>
+            <a:endCxn id="16" idx="4"/>
+          </p:cNvCxnSpPr>
+          <p:nvPr/>
+        </p:nvCxnSpPr>
+        <p:spPr>
+          <a:xfrm flipV="1">
+            <a:off x="4306486" y="3145505"/>
+            <a:ext cx="1048941" cy="915399"/>
+          </a:xfrm>
+          <a:prstGeom prst="straightConnector1">
+            <a:avLst/>
+          </a:prstGeom>
+          <a:ln>
+            <a:solidFill>
+              <a:schemeClr val="accent1"/>
+            </a:solidFill>
+            <a:prstDash val="dash"/>
+            <a:tailEnd type="triangle"/>
+          </a:ln>
+        </p:spPr>
+        <p:style>
+          <a:lnRef idx="1">
+            <a:schemeClr val="accent1"/>
+          </a:lnRef>
+          <a:fillRef idx="0">
+            <a:schemeClr val="accent1"/>
+          </a:fillRef>
+          <a:effectRef idx="0">
+            <a:schemeClr val="accent1"/>
+          </a:effectRef>
+          <a:fontRef idx="minor">
+            <a:schemeClr val="tx1"/>
+          </a:fontRef>
+        </p:style>
+      </p:cxnSp>
+      <p:sp>
+        <p:nvSpPr>
+          <p:cNvPr id="35" name="Rectangle 34"/>
+          <p:cNvSpPr/>
+          <p:nvPr/>
+        </p:nvSpPr>
+        <p:spPr>
+          <a:xfrm>
+            <a:off x="1885942" y="952530"/>
+            <a:ext cx="1085850" cy="573755"/>
+          </a:xfrm>
+          <a:prstGeom prst="rect">
+            <a:avLst/>
+          </a:prstGeom>
+        </p:spPr>
+        <p:style>
+          <a:lnRef idx="2">
+            <a:schemeClr val="accent1">
+              <a:shade val="50000"/>
+            </a:schemeClr>
+          </a:lnRef>
+          <a:fillRef idx="1">
+            <a:schemeClr val="accent1"/>
+          </a:fillRef>
+          <a:effectRef idx="0">
+            <a:schemeClr val="accent1"/>
+          </a:effectRef>
+          <a:fontRef idx="minor">
+            <a:schemeClr val="lt1"/>
+          </a:fontRef>
+        </p:style>
+        <p:txBody>
+          <a:bodyPr rtlCol="0" anchor="ctr"/>
+          <a:lstStyle/>
+          <a:p>
+            <a:pPr algn="ctr"/>
+            <a:r>
+              <a:rPr lang="en-US" dirty="0" smtClean="0"/>
+              <a:t>Client</a:t>
+            </a:r>
+            <a:endParaRPr lang="en-US" dirty="0"/>
+          </a:p>
+        </p:txBody>
+      </p:sp>
+      <p:cxnSp>
+        <p:nvCxnSpPr>
+          <p:cNvPr id="37" name="Straight Arrow Connector 36"/>
+          <p:cNvCxnSpPr>
+            <a:stCxn id="35" idx="2"/>
+            <a:endCxn id="4" idx="0"/>
+          </p:cNvCxnSpPr>
+          <p:nvPr/>
+        </p:nvCxnSpPr>
+        <p:spPr>
+          <a:xfrm>
+            <a:off x="2428867" y="1526285"/>
+            <a:ext cx="0" cy="488252"/>
+          </a:xfrm>
+          <a:prstGeom prst="straightConnector1">
+            <a:avLst/>
+          </a:prstGeom>
+          <a:ln>
+            <a:tailEnd type="triangle"/>
+          </a:ln>
+        </p:spPr>
+        <p:style>
+          <a:lnRef idx="1">
+            <a:schemeClr val="accent1"/>
+          </a:lnRef>
+          <a:fillRef idx="0">
+            <a:schemeClr val="accent1"/>
+          </a:fillRef>
+          <a:effectRef idx="0">
+            <a:schemeClr val="accent1"/>
+          </a:effectRef>
+          <a:fontRef idx="minor">
+            <a:schemeClr val="tx1"/>
+          </a:fontRef>
+        </p:style>
+      </p:cxnSp>
+    </p:spTree>
+    <p:extLst>
+      <p:ext uri="{BB962C8B-B14F-4D97-AF65-F5344CB8AC3E}">
+        <p14:creationId xmlns:p14="http://schemas.microsoft.com/office/powerpoint/2010/main" val="1921010676"/>
+      </p:ext>
+    </p:extLst>
+  </p:cSld>
+  <p:clrMapOvr>
+    <a:masterClrMapping/>
+  </p:clrMapOvr>
+</p:sld>
+</file>
+
+<file path=ppt/slides/slide6.xml><?xml version="1.0" encoding="utf-8"?>
+<p:sld xmlns:a="http://schemas.openxmlformats.org/drawingml/2006/main" xmlns:r="http://schemas.openxmlformats.org/officeDocument/2006/relationships" xmlns:p="http://schemas.openxmlformats.org/presentationml/2006/main">
+  <p:cSld>
+    <p:spTree>
+      <p:nvGrpSpPr>
+        <p:cNvPr id="1" name=""/>
+        <p:cNvGrpSpPr/>
+        <p:nvPr/>
+      </p:nvGrpSpPr>
+      <p:grpSpPr>
+        <a:xfrm>
+          <a:off x="0" y="0"/>
+          <a:ext cx="0" cy="0"/>
+          <a:chOff x="0" y="0"/>
+          <a:chExt cx="0" cy="0"/>
+        </a:xfrm>
+      </p:grpSpPr>
+      <p:sp>
+        <p:nvSpPr>
+          <p:cNvPr id="2" name="Title 1"/>
+          <p:cNvSpPr>
+            <a:spLocks noGrp="1"/>
+          </p:cNvSpPr>
+          <p:nvPr>
+            <p:ph type="title"/>
+          </p:nvPr>
+        </p:nvSpPr>
+        <p:spPr>
+          <a:xfrm>
+            <a:off x="838200" y="235902"/>
+            <a:ext cx="10515600" cy="642442"/>
+          </a:xfrm>
+        </p:spPr>
+        <p:txBody>
+          <a:bodyPr>
+            <a:normAutofit/>
+          </a:bodyPr>
+          <a:lstStyle/>
+          <a:p>
+            <a:r>
+              <a:rPr lang="en-US" sz="2500" dirty="0" smtClean="0"/>
+              <a:t>API gateway </a:t>
+            </a:r>
+            <a:r>
+              <a:rPr lang="mr-IN" sz="2500" dirty="0" smtClean="0"/>
+              <a:t>–</a:t>
+            </a:r>
+            <a:r>
+              <a:rPr lang="en-US" sz="2500" dirty="0" smtClean="0"/>
+              <a:t> enhanced</a:t>
+            </a:r>
+            <a:endParaRPr lang="en-US" sz="2500" dirty="0"/>
+          </a:p>
+        </p:txBody>
+      </p:sp>
+      <p:sp>
+        <p:nvSpPr>
+          <p:cNvPr id="4" name="Rectangle 3"/>
+          <p:cNvSpPr/>
+          <p:nvPr/>
+        </p:nvSpPr>
+        <p:spPr>
+          <a:xfrm>
+            <a:off x="1885942" y="2543177"/>
+            <a:ext cx="1085850" cy="573755"/>
+          </a:xfrm>
+          <a:prstGeom prst="rect">
+            <a:avLst/>
+          </a:prstGeom>
+        </p:spPr>
+        <p:style>
+          <a:lnRef idx="2">
+            <a:schemeClr val="accent1">
+              <a:shade val="50000"/>
+            </a:schemeClr>
+          </a:lnRef>
+          <a:fillRef idx="1">
+            <a:schemeClr val="accent1"/>
+          </a:fillRef>
+          <a:effectRef idx="0">
+            <a:schemeClr val="accent1"/>
+          </a:effectRef>
+          <a:fontRef idx="minor">
+            <a:schemeClr val="lt1"/>
+          </a:fontRef>
+        </p:style>
+        <p:txBody>
+          <a:bodyPr rtlCol="0" anchor="ctr"/>
+          <a:lstStyle/>
+          <a:p>
+            <a:pPr algn="ctr"/>
+            <a:r>
+              <a:rPr lang="en-US" dirty="0" err="1" smtClean="0"/>
+              <a:t>Zuul</a:t>
+            </a:r>
+            <a:endParaRPr lang="en-US" dirty="0"/>
+          </a:p>
+        </p:txBody>
+      </p:sp>
+      <p:sp>
+        <p:nvSpPr>
+          <p:cNvPr id="7" name="Triangle 6"/>
+          <p:cNvSpPr/>
+          <p:nvPr/>
+        </p:nvSpPr>
+        <p:spPr>
+          <a:xfrm>
+            <a:off x="357174" y="4093118"/>
+            <a:ext cx="1243013" cy="802355"/>
+          </a:xfrm>
+          <a:prstGeom prst="triangle">
+            <a:avLst/>
+          </a:prstGeom>
+        </p:spPr>
+        <p:style>
+          <a:lnRef idx="2">
+            <a:schemeClr val="dk1">
+              <a:shade val="50000"/>
+            </a:schemeClr>
+          </a:lnRef>
+          <a:fillRef idx="1">
+            <a:schemeClr val="dk1"/>
+          </a:fillRef>
+          <a:effectRef idx="0">
+            <a:schemeClr val="dk1"/>
+          </a:effectRef>
+          <a:fontRef idx="minor">
+            <a:schemeClr val="lt1"/>
+          </a:fontRef>
+        </p:style>
+        <p:txBody>
+          <a:bodyPr rtlCol="0" anchor="ctr"/>
+          <a:lstStyle/>
+          <a:p>
+            <a:pPr algn="ctr"/>
+            <a:r>
+              <a:rPr lang="en-US" sz="1000" dirty="0" smtClean="0"/>
+              <a:t>Hash </a:t>
+            </a:r>
+            <a:r>
+              <a:rPr lang="en-US" sz="1000" dirty="0" err="1" smtClean="0"/>
+              <a:t>Dehash</a:t>
+            </a:r>
+            <a:r>
+              <a:rPr lang="en-US" sz="1000" dirty="0" smtClean="0"/>
+              <a:t> 1</a:t>
+            </a:r>
+            <a:endParaRPr lang="en-US" sz="1000" dirty="0"/>
+          </a:p>
+        </p:txBody>
+      </p:sp>
+      <p:sp>
+        <p:nvSpPr>
+          <p:cNvPr id="10" name="Content Placeholder 9"/>
+          <p:cNvSpPr>
+            <a:spLocks noGrp="1"/>
+          </p:cNvSpPr>
+          <p:nvPr>
+            <p:ph idx="1"/>
+          </p:nvPr>
+        </p:nvSpPr>
+        <p:spPr>
+          <a:xfrm>
+            <a:off x="5986463" y="1094873"/>
+            <a:ext cx="5367336" cy="4720139"/>
+          </a:xfrm>
+        </p:spPr>
+        <p:txBody>
+          <a:bodyPr>
+            <a:normAutofit/>
+          </a:bodyPr>
+          <a:lstStyle/>
+          <a:p>
+            <a:r>
+              <a:rPr lang="en-US" dirty="0" smtClean="0"/>
+              <a:t>Multiple standalone instances of </a:t>
+            </a:r>
+            <a:r>
+              <a:rPr lang="en-US" dirty="0" err="1" smtClean="0"/>
+              <a:t>Zuul</a:t>
+            </a:r>
+            <a:endParaRPr lang="en-US" dirty="0" smtClean="0"/>
+          </a:p>
+          <a:p>
+            <a:r>
+              <a:rPr lang="en-US" dirty="0" smtClean="0"/>
+              <a:t>A load balancer (</a:t>
+            </a:r>
+            <a:r>
+              <a:rPr lang="en-US" dirty="0" smtClean="0"/>
+              <a:t>ELB or Nginx cluster) to </a:t>
+            </a:r>
+            <a:r>
+              <a:rPr lang="en-US" dirty="0" smtClean="0"/>
+              <a:t>distribute load </a:t>
+            </a:r>
+            <a:r>
+              <a:rPr lang="en-US" dirty="0" err="1" smtClean="0"/>
+              <a:t>accross</a:t>
+            </a:r>
+            <a:r>
+              <a:rPr lang="en-US" dirty="0" smtClean="0"/>
+              <a:t> instances of </a:t>
+            </a:r>
+            <a:r>
+              <a:rPr lang="en-US" dirty="0" err="1" smtClean="0"/>
+              <a:t>Zuul</a:t>
+            </a:r>
+            <a:endParaRPr lang="en-US" dirty="0" smtClean="0"/>
+          </a:p>
+          <a:p>
+            <a:r>
+              <a:rPr lang="en-US" dirty="0" smtClean="0"/>
+              <a:t>Multiple instances of Eureka</a:t>
+            </a:r>
+          </a:p>
+          <a:p>
+            <a:r>
+              <a:rPr lang="en-US" dirty="0" smtClean="0"/>
+              <a:t>A </a:t>
+            </a:r>
+            <a:r>
+              <a:rPr lang="en-US" dirty="0" err="1" smtClean="0"/>
+              <a:t>config</a:t>
+            </a:r>
+            <a:r>
+              <a:rPr lang="en-US" dirty="0" smtClean="0"/>
+              <a:t> server to store distributed </a:t>
+            </a:r>
+            <a:r>
+              <a:rPr lang="en-US" dirty="0" err="1" smtClean="0"/>
+              <a:t>config</a:t>
+            </a:r>
+            <a:r>
+              <a:rPr lang="en-US" dirty="0" smtClean="0"/>
+              <a:t> of the services. </a:t>
+            </a:r>
+            <a:r>
+              <a:rPr lang="en-US" dirty="0" err="1" smtClean="0"/>
+              <a:t>E.g.Spring</a:t>
+            </a:r>
+            <a:r>
+              <a:rPr lang="en-US" dirty="0" smtClean="0"/>
+              <a:t> cloud </a:t>
+            </a:r>
+            <a:r>
+              <a:rPr lang="en-US" dirty="0" err="1" smtClean="0"/>
+              <a:t>config</a:t>
+            </a:r>
+            <a:r>
+              <a:rPr lang="en-US" dirty="0" smtClean="0"/>
+              <a:t> or zookeeper</a:t>
+            </a:r>
+          </a:p>
+          <a:p>
+            <a:endParaRPr lang="en-US" dirty="0" smtClean="0"/>
+          </a:p>
+          <a:p>
+            <a:endParaRPr lang="en-US" dirty="0" smtClean="0"/>
+          </a:p>
+          <a:p>
+            <a:endParaRPr lang="en-US" dirty="0" smtClean="0"/>
+          </a:p>
+          <a:p>
+            <a:pPr lvl="1"/>
+            <a:endParaRPr lang="en-US" sz="2000" dirty="0"/>
+          </a:p>
+        </p:txBody>
+      </p:sp>
+      <p:sp>
+        <p:nvSpPr>
+          <p:cNvPr id="13" name="Triangle 12"/>
+          <p:cNvSpPr/>
+          <p:nvPr/>
+        </p:nvSpPr>
+        <p:spPr>
+          <a:xfrm>
+            <a:off x="1921658" y="4164558"/>
+            <a:ext cx="1243013" cy="802355"/>
+          </a:xfrm>
+          <a:prstGeom prst="triangle">
+            <a:avLst/>
+          </a:prstGeom>
+        </p:spPr>
+        <p:style>
+          <a:lnRef idx="2">
+            <a:schemeClr val="dk1">
+              <a:shade val="50000"/>
+            </a:schemeClr>
+          </a:lnRef>
+          <a:fillRef idx="1">
+            <a:schemeClr val="dk1"/>
+          </a:fillRef>
+          <a:effectRef idx="0">
+            <a:schemeClr val="dk1"/>
+          </a:effectRef>
+          <a:fontRef idx="minor">
+            <a:schemeClr val="lt1"/>
+          </a:fontRef>
+        </p:style>
+        <p:txBody>
+          <a:bodyPr rtlCol="0" anchor="ctr"/>
+          <a:lstStyle/>
+          <a:p>
+            <a:pPr algn="ctr"/>
+            <a:r>
+              <a:rPr lang="en-US" sz="1000" dirty="0" smtClean="0"/>
+              <a:t>Hash </a:t>
+            </a:r>
+            <a:r>
+              <a:rPr lang="en-US" sz="1000" dirty="0" err="1" smtClean="0"/>
+              <a:t>Dehash</a:t>
+            </a:r>
+            <a:r>
+              <a:rPr lang="en-US" sz="1000" dirty="0" smtClean="0"/>
+              <a:t> 2</a:t>
+            </a:r>
+            <a:endParaRPr lang="en-US" sz="1000" dirty="0"/>
+          </a:p>
+        </p:txBody>
+      </p:sp>
+      <p:sp>
+        <p:nvSpPr>
+          <p:cNvPr id="14" name="Triangle 13"/>
+          <p:cNvSpPr/>
+          <p:nvPr/>
+        </p:nvSpPr>
+        <p:spPr>
+          <a:xfrm>
+            <a:off x="3374226" y="4188366"/>
+            <a:ext cx="1243013" cy="802355"/>
+          </a:xfrm>
+          <a:prstGeom prst="triangle">
+            <a:avLst/>
+          </a:prstGeom>
+        </p:spPr>
+        <p:style>
+          <a:lnRef idx="2">
+            <a:schemeClr val="dk1">
+              <a:shade val="50000"/>
+            </a:schemeClr>
+          </a:lnRef>
+          <a:fillRef idx="1">
+            <a:schemeClr val="dk1"/>
+          </a:fillRef>
+          <a:effectRef idx="0">
+            <a:schemeClr val="dk1"/>
+          </a:effectRef>
+          <a:fontRef idx="minor">
+            <a:schemeClr val="lt1"/>
+          </a:fontRef>
+        </p:style>
+        <p:txBody>
+          <a:bodyPr rtlCol="0" anchor="ctr"/>
+          <a:lstStyle/>
+          <a:p>
+            <a:pPr algn="ctr"/>
+            <a:r>
+              <a:rPr lang="en-US" sz="1000" dirty="0" smtClean="0"/>
+              <a:t>Hash </a:t>
+            </a:r>
+            <a:r>
+              <a:rPr lang="en-US" sz="1000" dirty="0" err="1" smtClean="0"/>
+              <a:t>Dehash</a:t>
+            </a:r>
+            <a:r>
+              <a:rPr lang="en-US" sz="1000" dirty="0" smtClean="0"/>
+              <a:t> 3</a:t>
+            </a:r>
+            <a:endParaRPr lang="en-US" sz="1000" dirty="0"/>
+          </a:p>
+        </p:txBody>
+      </p:sp>
+      <p:sp>
+        <p:nvSpPr>
+          <p:cNvPr id="16" name="Oval 15"/>
+          <p:cNvSpPr/>
+          <p:nvPr/>
+        </p:nvSpPr>
+        <p:spPr>
+          <a:xfrm>
+            <a:off x="4758920" y="2911478"/>
+            <a:ext cx="1193014" cy="762667"/>
+          </a:xfrm>
+          <a:prstGeom prst="ellipse">
+            <a:avLst/>
+          </a:prstGeom>
+        </p:spPr>
+        <p:style>
+          <a:lnRef idx="2">
+            <a:schemeClr val="accent1">
+              <a:shade val="50000"/>
+            </a:schemeClr>
+          </a:lnRef>
+          <a:fillRef idx="1">
+            <a:schemeClr val="accent1"/>
+          </a:fillRef>
+          <a:effectRef idx="0">
+            <a:schemeClr val="accent1"/>
+          </a:effectRef>
+          <a:fontRef idx="minor">
+            <a:schemeClr val="lt1"/>
+          </a:fontRef>
+        </p:style>
+        <p:txBody>
+          <a:bodyPr rtlCol="0" anchor="ctr"/>
+          <a:lstStyle/>
+          <a:p>
+            <a:pPr algn="ctr"/>
+            <a:r>
+              <a:rPr lang="en-US" dirty="0"/>
+              <a:t>Eureka</a:t>
+            </a:r>
+            <a:endParaRPr lang="en-US" dirty="0"/>
+          </a:p>
+        </p:txBody>
+      </p:sp>
+      <p:cxnSp>
+        <p:nvCxnSpPr>
+          <p:cNvPr id="18" name="Straight Arrow Connector 17"/>
+          <p:cNvCxnSpPr/>
+          <p:nvPr/>
+        </p:nvCxnSpPr>
+        <p:spPr>
+          <a:xfrm flipH="1">
+            <a:off x="978681" y="3040071"/>
+            <a:ext cx="964414" cy="1124487"/>
+          </a:xfrm>
+          <a:prstGeom prst="straightConnector1">
+            <a:avLst/>
+          </a:prstGeom>
+          <a:ln>
+            <a:tailEnd type="triangle"/>
+          </a:ln>
+        </p:spPr>
+        <p:style>
+          <a:lnRef idx="1">
+            <a:schemeClr val="accent1"/>
+          </a:lnRef>
+          <a:fillRef idx="0">
+            <a:schemeClr val="accent1"/>
+          </a:fillRef>
+          <a:effectRef idx="0">
+            <a:schemeClr val="accent1"/>
+          </a:effectRef>
+          <a:fontRef idx="minor">
+            <a:schemeClr val="tx1"/>
+          </a:fontRef>
+        </p:style>
+      </p:cxnSp>
+      <p:cxnSp>
+        <p:nvCxnSpPr>
+          <p:cNvPr id="20" name="Straight Arrow Connector 19"/>
+          <p:cNvCxnSpPr>
+            <a:stCxn id="4" idx="2"/>
+            <a:endCxn id="13" idx="0"/>
+          </p:cNvCxnSpPr>
+          <p:nvPr/>
+        </p:nvCxnSpPr>
+        <p:spPr>
+          <a:xfrm>
+            <a:off x="2428867" y="3116932"/>
+            <a:ext cx="114298" cy="1047626"/>
+          </a:xfrm>
+          <a:prstGeom prst="straightConnector1">
+            <a:avLst/>
+          </a:prstGeom>
+          <a:ln>
+            <a:tailEnd type="triangle"/>
+          </a:ln>
+        </p:spPr>
+        <p:style>
+          <a:lnRef idx="1">
+            <a:schemeClr val="accent1"/>
+          </a:lnRef>
+          <a:fillRef idx="0">
+            <a:schemeClr val="accent1"/>
+          </a:fillRef>
+          <a:effectRef idx="0">
+            <a:schemeClr val="accent1"/>
+          </a:effectRef>
+          <a:fontRef idx="minor">
+            <a:schemeClr val="tx1"/>
+          </a:fontRef>
+        </p:style>
+      </p:cxnSp>
+      <p:cxnSp>
+        <p:nvCxnSpPr>
+          <p:cNvPr id="22" name="Straight Arrow Connector 21"/>
+          <p:cNvCxnSpPr>
+            <a:endCxn id="14" idx="0"/>
+          </p:cNvCxnSpPr>
+          <p:nvPr/>
+        </p:nvCxnSpPr>
+        <p:spPr>
+          <a:xfrm>
+            <a:off x="2850356" y="3116932"/>
+            <a:ext cx="1145377" cy="1071434"/>
+          </a:xfrm>
+          <a:prstGeom prst="straightConnector1">
+            <a:avLst/>
+          </a:prstGeom>
+          <a:ln>
+            <a:tailEnd type="triangle"/>
+          </a:ln>
+        </p:spPr>
+        <p:style>
+          <a:lnRef idx="1">
+            <a:schemeClr val="accent1"/>
+          </a:lnRef>
+          <a:fillRef idx="0">
+            <a:schemeClr val="accent1"/>
+          </a:fillRef>
+          <a:effectRef idx="0">
+            <a:schemeClr val="accent1"/>
+          </a:effectRef>
+          <a:fontRef idx="minor">
+            <a:schemeClr val="tx1"/>
+          </a:fontRef>
+        </p:style>
+      </p:cxnSp>
+      <p:sp>
+        <p:nvSpPr>
+          <p:cNvPr id="23" name="Rectangle 22"/>
+          <p:cNvSpPr/>
+          <p:nvPr/>
+        </p:nvSpPr>
+        <p:spPr>
+          <a:xfrm>
+            <a:off x="1171575" y="3574130"/>
+            <a:ext cx="2414588" cy="169198"/>
+          </a:xfrm>
+          <a:prstGeom prst="rect">
+            <a:avLst/>
+          </a:prstGeom>
+          <a:gradFill>
+            <a:gsLst>
+              <a:gs pos="0">
+                <a:schemeClr val="accent1">
+                  <a:lumMod val="5000"/>
+                  <a:lumOff val="95000"/>
+                </a:schemeClr>
+              </a:gs>
+              <a:gs pos="74000">
+                <a:schemeClr val="accent1">
+                  <a:lumMod val="45000"/>
+                  <a:lumOff val="55000"/>
+                </a:schemeClr>
+              </a:gs>
+              <a:gs pos="83000">
+                <a:schemeClr val="accent1">
+                  <a:lumMod val="45000"/>
+                  <a:lumOff val="55000"/>
+                </a:schemeClr>
+              </a:gs>
+              <a:gs pos="100000">
+                <a:schemeClr val="accent1">
+                  <a:lumMod val="30000"/>
+                  <a:lumOff val="70000"/>
+                </a:schemeClr>
+              </a:gs>
+            </a:gsLst>
+            <a:lin ang="5400000" scaled="1"/>
+          </a:gradFill>
+        </p:spPr>
+        <p:style>
+          <a:lnRef idx="2">
+            <a:schemeClr val="accent1">
+              <a:shade val="50000"/>
+            </a:schemeClr>
+          </a:lnRef>
+          <a:fillRef idx="1">
+            <a:schemeClr val="accent1"/>
+          </a:fillRef>
+          <a:effectRef idx="0">
+            <a:schemeClr val="accent1"/>
+          </a:effectRef>
+          <a:fontRef idx="minor">
+            <a:schemeClr val="lt1"/>
+          </a:fontRef>
+        </p:style>
+        <p:txBody>
+          <a:bodyPr rtlCol="0" anchor="ctr"/>
+          <a:lstStyle/>
+          <a:p>
+            <a:pPr algn="ctr"/>
+            <a:r>
+              <a:rPr lang="en-US" dirty="0" smtClean="0"/>
+              <a:t>REST</a:t>
+            </a:r>
+            <a:endParaRPr lang="en-US" dirty="0"/>
+          </a:p>
+        </p:txBody>
+      </p:sp>
+      <p:sp>
+        <p:nvSpPr>
+          <p:cNvPr id="19" name="Can 18"/>
+          <p:cNvSpPr/>
+          <p:nvPr/>
+        </p:nvSpPr>
+        <p:spPr>
+          <a:xfrm>
+            <a:off x="2093110" y="5514977"/>
+            <a:ext cx="878682" cy="716629"/>
+          </a:xfrm>
+          <a:prstGeom prst="can">
+            <a:avLst/>
+          </a:prstGeom>
+          <a:gradFill flip="none" rotWithShape="1">
+            <a:gsLst>
+              <a:gs pos="0">
+                <a:srgbClr val="92D050">
+                  <a:shade val="30000"/>
+                  <a:satMod val="115000"/>
+                </a:srgbClr>
+              </a:gs>
+              <a:gs pos="50000">
+                <a:srgbClr val="92D050">
+                  <a:shade val="67500"/>
+                  <a:satMod val="115000"/>
+                </a:srgbClr>
+              </a:gs>
+              <a:gs pos="100000">
+                <a:srgbClr val="92D050">
+                  <a:shade val="100000"/>
+                  <a:satMod val="115000"/>
+                </a:srgbClr>
+              </a:gs>
+            </a:gsLst>
+            <a:path path="circle">
+              <a:fillToRect l="50000" t="50000" r="50000" b="50000"/>
+            </a:path>
+            <a:tileRect/>
+          </a:gradFill>
+        </p:spPr>
+        <p:style>
+          <a:lnRef idx="2">
+            <a:schemeClr val="accent1">
+              <a:shade val="50000"/>
+            </a:schemeClr>
+          </a:lnRef>
+          <a:fillRef idx="1">
+            <a:schemeClr val="accent1"/>
+          </a:fillRef>
+          <a:effectRef idx="0">
+            <a:schemeClr val="accent1"/>
+          </a:effectRef>
+          <a:fontRef idx="minor">
+            <a:schemeClr val="lt1"/>
+          </a:fontRef>
+        </p:style>
+        <p:txBody>
+          <a:bodyPr vert="horz" rtlCol="0" anchor="ctr"/>
+          <a:lstStyle/>
+          <a:p>
+            <a:pPr algn="ctr"/>
+            <a:r>
+              <a:rPr lang="en-US" sz="1200" dirty="0" smtClean="0"/>
+              <a:t>DB</a:t>
+            </a:r>
+            <a:endParaRPr lang="en-US" sz="1200" dirty="0"/>
+          </a:p>
+        </p:txBody>
+      </p:sp>
+      <p:cxnSp>
+        <p:nvCxnSpPr>
+          <p:cNvPr id="5" name="Straight Arrow Connector 4"/>
+          <p:cNvCxnSpPr>
+            <a:endCxn id="19" idx="1"/>
+          </p:cNvCxnSpPr>
+          <p:nvPr/>
+        </p:nvCxnSpPr>
+        <p:spPr>
+          <a:xfrm>
+            <a:off x="978681" y="4966913"/>
+            <a:ext cx="1553770" cy="548064"/>
+          </a:xfrm>
+          <a:prstGeom prst="straightConnector1">
+            <a:avLst/>
+          </a:prstGeom>
+          <a:ln>
+            <a:tailEnd type="triangle"/>
+          </a:ln>
+        </p:spPr>
+        <p:style>
+          <a:lnRef idx="1">
+            <a:schemeClr val="accent1"/>
+          </a:lnRef>
+          <a:fillRef idx="0">
+            <a:schemeClr val="accent1"/>
+          </a:fillRef>
+          <a:effectRef idx="0">
+            <a:schemeClr val="accent1"/>
+          </a:effectRef>
+          <a:fontRef idx="minor">
+            <a:schemeClr val="tx1"/>
+          </a:fontRef>
+        </p:style>
+      </p:cxnSp>
+      <p:cxnSp>
+        <p:nvCxnSpPr>
+          <p:cNvPr id="8" name="Straight Arrow Connector 7"/>
+          <p:cNvCxnSpPr>
+            <a:stCxn id="13" idx="3"/>
+            <a:endCxn id="19" idx="1"/>
+          </p:cNvCxnSpPr>
+          <p:nvPr/>
+        </p:nvCxnSpPr>
+        <p:spPr>
+          <a:xfrm flipH="1">
+            <a:off x="2532451" y="4966913"/>
+            <a:ext cx="10714" cy="548064"/>
+          </a:xfrm>
+          <a:prstGeom prst="straightConnector1">
+            <a:avLst/>
+          </a:prstGeom>
+          <a:ln>
+            <a:tailEnd type="triangle"/>
+          </a:ln>
+        </p:spPr>
+        <p:style>
+          <a:lnRef idx="1">
+            <a:schemeClr val="accent1"/>
+          </a:lnRef>
+          <a:fillRef idx="0">
+            <a:schemeClr val="accent1"/>
+          </a:fillRef>
+          <a:effectRef idx="0">
+            <a:schemeClr val="accent1"/>
+          </a:effectRef>
+          <a:fontRef idx="minor">
+            <a:schemeClr val="tx1"/>
+          </a:fontRef>
+        </p:style>
+      </p:cxnSp>
+      <p:cxnSp>
+        <p:nvCxnSpPr>
+          <p:cNvPr id="11" name="Straight Arrow Connector 10"/>
+          <p:cNvCxnSpPr>
+            <a:stCxn id="14" idx="3"/>
+            <a:endCxn id="19" idx="1"/>
+          </p:cNvCxnSpPr>
+          <p:nvPr/>
+        </p:nvCxnSpPr>
+        <p:spPr>
+          <a:xfrm flipH="1">
+            <a:off x="2532451" y="4990721"/>
+            <a:ext cx="1463282" cy="524256"/>
+          </a:xfrm>
+          <a:prstGeom prst="straightConnector1">
+            <a:avLst/>
+          </a:prstGeom>
+          <a:ln>
+            <a:tailEnd type="triangle"/>
+          </a:ln>
+        </p:spPr>
+        <p:style>
+          <a:lnRef idx="1">
+            <a:schemeClr val="accent1"/>
+          </a:lnRef>
+          <a:fillRef idx="0">
+            <a:schemeClr val="accent1"/>
+          </a:fillRef>
+          <a:effectRef idx="0">
+            <a:schemeClr val="accent1"/>
+          </a:effectRef>
+          <a:fontRef idx="minor">
+            <a:schemeClr val="tx1"/>
+          </a:fontRef>
+        </p:style>
+      </p:cxnSp>
+      <p:sp>
+        <p:nvSpPr>
+          <p:cNvPr id="17" name="Can 16"/>
+          <p:cNvSpPr/>
+          <p:nvPr/>
+        </p:nvSpPr>
+        <p:spPr>
+          <a:xfrm>
+            <a:off x="2214545" y="5657976"/>
+            <a:ext cx="950126" cy="719078"/>
+          </a:xfrm>
+          <a:prstGeom prst="can">
+            <a:avLst/>
+          </a:prstGeom>
+          <a:gradFill flip="none" rotWithShape="1">
+            <a:gsLst>
+              <a:gs pos="0">
+                <a:srgbClr val="92D050">
+                  <a:shade val="30000"/>
+                  <a:satMod val="115000"/>
+                </a:srgbClr>
+              </a:gs>
+              <a:gs pos="50000">
+                <a:srgbClr val="92D050">
+                  <a:shade val="67500"/>
+                  <a:satMod val="115000"/>
+                </a:srgbClr>
+              </a:gs>
+              <a:gs pos="100000">
+                <a:srgbClr val="92D050">
+                  <a:shade val="100000"/>
+                  <a:satMod val="115000"/>
+                </a:srgbClr>
+              </a:gs>
+            </a:gsLst>
+            <a:path path="circle">
+              <a:fillToRect l="50000" t="50000" r="50000" b="50000"/>
+            </a:path>
+            <a:tileRect/>
+          </a:gradFill>
+        </p:spPr>
+        <p:style>
+          <a:lnRef idx="2">
+            <a:schemeClr val="accent1">
+              <a:shade val="50000"/>
+            </a:schemeClr>
+          </a:lnRef>
+          <a:fillRef idx="1">
+            <a:schemeClr val="accent1"/>
+          </a:fillRef>
+          <a:effectRef idx="0">
+            <a:schemeClr val="accent1"/>
+          </a:effectRef>
+          <a:fontRef idx="minor">
+            <a:schemeClr val="lt1"/>
+          </a:fontRef>
+        </p:style>
+        <p:txBody>
+          <a:bodyPr vert="horz" rtlCol="0" anchor="ctr"/>
+          <a:lstStyle/>
+          <a:p>
+            <a:pPr algn="ctr"/>
+            <a:r>
+              <a:rPr lang="en-US" sz="1200" smtClean="0"/>
+              <a:t>Cassandra</a:t>
+            </a:r>
+            <a:endParaRPr lang="en-US" sz="1200" dirty="0"/>
+          </a:p>
+        </p:txBody>
+      </p:sp>
+      <p:cxnSp>
+        <p:nvCxnSpPr>
+          <p:cNvPr id="15" name="Straight Arrow Connector 14"/>
+          <p:cNvCxnSpPr>
+            <a:stCxn id="4" idx="3"/>
+            <a:endCxn id="16" idx="2"/>
+          </p:cNvCxnSpPr>
+          <p:nvPr/>
+        </p:nvCxnSpPr>
+        <p:spPr>
+          <a:xfrm>
+            <a:off x="2971792" y="2830055"/>
+            <a:ext cx="1787128" cy="462757"/>
+          </a:xfrm>
+          <a:prstGeom prst="straightConnector1">
+            <a:avLst/>
+          </a:prstGeom>
+          <a:ln>
+            <a:headEnd type="triangle"/>
+            <a:tailEnd type="triangle"/>
+          </a:ln>
+        </p:spPr>
+        <p:style>
+          <a:lnRef idx="1">
+            <a:schemeClr val="accent1"/>
+          </a:lnRef>
+          <a:fillRef idx="0">
+            <a:schemeClr val="accent1"/>
+          </a:fillRef>
+          <a:effectRef idx="0">
+            <a:schemeClr val="accent1"/>
+          </a:effectRef>
+          <a:fontRef idx="minor">
+            <a:schemeClr val="tx1"/>
+          </a:fontRef>
+        </p:style>
+      </p:cxnSp>
+      <p:cxnSp>
+        <p:nvCxnSpPr>
+          <p:cNvPr id="26" name="Straight Arrow Connector 25"/>
+          <p:cNvCxnSpPr>
+            <a:endCxn id="16" idx="3"/>
+          </p:cNvCxnSpPr>
+          <p:nvPr/>
+        </p:nvCxnSpPr>
+        <p:spPr>
+          <a:xfrm flipV="1">
+            <a:off x="1264436" y="3562455"/>
+            <a:ext cx="3669197" cy="842441"/>
+          </a:xfrm>
+          <a:prstGeom prst="straightConnector1">
+            <a:avLst/>
+          </a:prstGeom>
+          <a:ln>
+            <a:solidFill>
+              <a:schemeClr val="accent1"/>
+            </a:solidFill>
+            <a:prstDash val="dash"/>
+            <a:tailEnd type="triangle"/>
+          </a:ln>
+        </p:spPr>
+        <p:style>
+          <a:lnRef idx="1">
+            <a:schemeClr val="accent1"/>
+          </a:lnRef>
+          <a:fillRef idx="0">
+            <a:schemeClr val="accent1"/>
+          </a:fillRef>
+          <a:effectRef idx="0">
+            <a:schemeClr val="accent1"/>
+          </a:effectRef>
+          <a:fontRef idx="minor">
+            <a:schemeClr val="tx1"/>
+          </a:fontRef>
+        </p:style>
+      </p:cxnSp>
+      <p:cxnSp>
+        <p:nvCxnSpPr>
+          <p:cNvPr id="27" name="Straight Arrow Connector 26"/>
+          <p:cNvCxnSpPr>
+            <a:stCxn id="13" idx="5"/>
+          </p:cNvCxnSpPr>
+          <p:nvPr/>
+        </p:nvCxnSpPr>
+        <p:spPr>
+          <a:xfrm flipV="1">
+            <a:off x="2853918" y="3649580"/>
+            <a:ext cx="2262632" cy="916156"/>
+          </a:xfrm>
+          <a:prstGeom prst="straightConnector1">
+            <a:avLst/>
+          </a:prstGeom>
+          <a:ln>
+            <a:solidFill>
+              <a:schemeClr val="accent1"/>
+            </a:solidFill>
+            <a:prstDash val="dash"/>
+            <a:tailEnd type="triangle"/>
+          </a:ln>
+        </p:spPr>
+        <p:style>
+          <a:lnRef idx="1">
+            <a:schemeClr val="accent1"/>
+          </a:lnRef>
+          <a:fillRef idx="0">
+            <a:schemeClr val="accent1"/>
+          </a:fillRef>
+          <a:effectRef idx="0">
+            <a:schemeClr val="accent1"/>
+          </a:effectRef>
+          <a:fontRef idx="minor">
+            <a:schemeClr val="tx1"/>
+          </a:fontRef>
+        </p:style>
+      </p:cxnSp>
+      <p:cxnSp>
+        <p:nvCxnSpPr>
+          <p:cNvPr id="31" name="Straight Arrow Connector 30"/>
+          <p:cNvCxnSpPr>
+            <a:stCxn id="14" idx="5"/>
+            <a:endCxn id="16" idx="4"/>
+          </p:cNvCxnSpPr>
+          <p:nvPr/>
+        </p:nvCxnSpPr>
+        <p:spPr>
+          <a:xfrm flipV="1">
+            <a:off x="4306486" y="3674145"/>
+            <a:ext cx="1048941" cy="915399"/>
+          </a:xfrm>
+          <a:prstGeom prst="straightConnector1">
+            <a:avLst/>
+          </a:prstGeom>
+          <a:ln>
+            <a:solidFill>
+              <a:schemeClr val="accent1"/>
+            </a:solidFill>
+            <a:prstDash val="dash"/>
+            <a:tailEnd type="triangle"/>
+          </a:ln>
+        </p:spPr>
+        <p:style>
+          <a:lnRef idx="1">
+            <a:schemeClr val="accent1"/>
+          </a:lnRef>
+          <a:fillRef idx="0">
+            <a:schemeClr val="accent1"/>
+          </a:fillRef>
+          <a:effectRef idx="0">
+            <a:schemeClr val="accent1"/>
+          </a:effectRef>
+          <a:fontRef idx="minor">
+            <a:schemeClr val="tx1"/>
+          </a:fontRef>
+        </p:style>
+      </p:cxnSp>
+      <p:sp>
+        <p:nvSpPr>
+          <p:cNvPr id="35" name="Rectangle 34"/>
+          <p:cNvSpPr/>
+          <p:nvPr/>
+        </p:nvSpPr>
+        <p:spPr>
+          <a:xfrm>
+            <a:off x="1264436" y="1827115"/>
+            <a:ext cx="2109790" cy="184811"/>
+          </a:xfrm>
+          <a:prstGeom prst="rect">
+            <a:avLst/>
+          </a:prstGeom>
+        </p:spPr>
+        <p:style>
+          <a:lnRef idx="2">
+            <a:schemeClr val="accent1">
+              <a:shade val="50000"/>
+            </a:schemeClr>
+          </a:lnRef>
+          <a:fillRef idx="1">
+            <a:schemeClr val="accent1"/>
+          </a:fillRef>
+          <a:effectRef idx="0">
+            <a:schemeClr val="accent1"/>
+          </a:effectRef>
+          <a:fontRef idx="minor">
+            <a:schemeClr val="lt1"/>
+          </a:fontRef>
+        </p:style>
+        <p:txBody>
+          <a:bodyPr rtlCol="0" anchor="ctr"/>
+          <a:lstStyle/>
+          <a:p>
+            <a:pPr algn="ctr"/>
+            <a:r>
+              <a:rPr lang="en-US" dirty="0" smtClean="0"/>
+              <a:t>Load Balancer</a:t>
+            </a:r>
+            <a:endParaRPr lang="en-US" dirty="0"/>
+          </a:p>
+        </p:txBody>
+      </p:sp>
+      <p:cxnSp>
+        <p:nvCxnSpPr>
+          <p:cNvPr id="37" name="Straight Arrow Connector 36"/>
+          <p:cNvCxnSpPr>
+            <a:stCxn id="35" idx="2"/>
+            <a:endCxn id="24" idx="0"/>
+          </p:cNvCxnSpPr>
+          <p:nvPr/>
+        </p:nvCxnSpPr>
+        <p:spPr>
+          <a:xfrm>
+            <a:off x="2319331" y="2011926"/>
+            <a:ext cx="2372" cy="393535"/>
+          </a:xfrm>
+          <a:prstGeom prst="straightConnector1">
+            <a:avLst/>
+          </a:prstGeom>
+          <a:ln>
+            <a:tailEnd type="triangle"/>
+          </a:ln>
+        </p:spPr>
+        <p:style>
+          <a:lnRef idx="1">
+            <a:schemeClr val="accent1"/>
+          </a:lnRef>
+          <a:fillRef idx="0">
+            <a:schemeClr val="accent1"/>
+          </a:fillRef>
+          <a:effectRef idx="0">
+            <a:schemeClr val="accent1"/>
+          </a:effectRef>
+          <a:fontRef idx="minor">
+            <a:schemeClr val="tx1"/>
+          </a:fontRef>
+        </p:style>
+      </p:cxnSp>
+      <p:sp>
+        <p:nvSpPr>
+          <p:cNvPr id="24" name="Rectangle 23"/>
+          <p:cNvSpPr/>
+          <p:nvPr/>
+        </p:nvSpPr>
+        <p:spPr>
+          <a:xfrm>
+            <a:off x="1778778" y="2405461"/>
+            <a:ext cx="1085850" cy="573755"/>
+          </a:xfrm>
+          <a:prstGeom prst="rect">
+            <a:avLst/>
+          </a:prstGeom>
+        </p:spPr>
+        <p:style>
+          <a:lnRef idx="2">
+            <a:schemeClr val="accent1">
+              <a:shade val="50000"/>
+            </a:schemeClr>
+          </a:lnRef>
+          <a:fillRef idx="1">
+            <a:schemeClr val="accent1"/>
+          </a:fillRef>
+          <a:effectRef idx="0">
+            <a:schemeClr val="accent1"/>
+          </a:effectRef>
+          <a:fontRef idx="minor">
+            <a:schemeClr val="lt1"/>
+          </a:fontRef>
+        </p:style>
+        <p:txBody>
+          <a:bodyPr rtlCol="0" anchor="ctr"/>
+          <a:lstStyle/>
+          <a:p>
+            <a:pPr algn="ctr"/>
+            <a:r>
+              <a:rPr lang="en-US" dirty="0" err="1" smtClean="0"/>
+              <a:t>Zuul</a:t>
+            </a:r>
+            <a:endParaRPr lang="en-US" dirty="0"/>
+          </a:p>
+        </p:txBody>
+      </p:sp>
+      <p:sp>
+        <p:nvSpPr>
+          <p:cNvPr id="25" name="Oval 24"/>
+          <p:cNvSpPr/>
+          <p:nvPr/>
+        </p:nvSpPr>
+        <p:spPr>
+          <a:xfrm>
+            <a:off x="4681219" y="2759117"/>
+            <a:ext cx="1193014" cy="762667"/>
+          </a:xfrm>
+          <a:prstGeom prst="ellipse">
+            <a:avLst/>
+          </a:prstGeom>
+        </p:spPr>
+        <p:style>
+          <a:lnRef idx="2">
+            <a:schemeClr val="accent1">
+              <a:shade val="50000"/>
+            </a:schemeClr>
+          </a:lnRef>
+          <a:fillRef idx="1">
+            <a:schemeClr val="accent1"/>
+          </a:fillRef>
+          <a:effectRef idx="0">
+            <a:schemeClr val="accent1"/>
+          </a:effectRef>
+          <a:fontRef idx="minor">
+            <a:schemeClr val="lt1"/>
+          </a:fontRef>
+        </p:style>
+        <p:txBody>
+          <a:bodyPr rtlCol="0" anchor="ctr"/>
+          <a:lstStyle/>
+          <a:p>
+            <a:pPr algn="ctr"/>
+            <a:r>
+              <a:rPr lang="en-US" dirty="0"/>
+              <a:t>Eureka</a:t>
+            </a:r>
+            <a:endParaRPr lang="en-US" dirty="0"/>
+          </a:p>
+        </p:txBody>
+      </p:sp>
+      <p:sp>
+        <p:nvSpPr>
+          <p:cNvPr id="28" name="Rectangle 27"/>
+          <p:cNvSpPr/>
+          <p:nvPr/>
+        </p:nvSpPr>
+        <p:spPr>
+          <a:xfrm>
+            <a:off x="1685915" y="1201665"/>
+            <a:ext cx="1193014" cy="149161"/>
+          </a:xfrm>
+          <a:prstGeom prst="rect">
+            <a:avLst/>
+          </a:prstGeom>
+        </p:spPr>
+        <p:style>
+          <a:lnRef idx="2">
+            <a:schemeClr val="accent1">
+              <a:shade val="50000"/>
+            </a:schemeClr>
+          </a:lnRef>
+          <a:fillRef idx="1">
+            <a:schemeClr val="accent1"/>
+          </a:fillRef>
+          <a:effectRef idx="0">
+            <a:schemeClr val="accent1"/>
+          </a:effectRef>
+          <a:fontRef idx="minor">
+            <a:schemeClr val="lt1"/>
+          </a:fontRef>
+        </p:style>
+        <p:txBody>
+          <a:bodyPr rtlCol="0" anchor="ctr"/>
+          <a:lstStyle/>
+          <a:p>
+            <a:pPr algn="ctr"/>
+            <a:r>
+              <a:rPr lang="en-US" dirty="0" smtClean="0"/>
+              <a:t>Client</a:t>
+            </a:r>
+            <a:endParaRPr lang="en-US" dirty="0"/>
+          </a:p>
+        </p:txBody>
+      </p:sp>
+      <p:cxnSp>
+        <p:nvCxnSpPr>
+          <p:cNvPr id="33" name="Straight Arrow Connector 32"/>
+          <p:cNvCxnSpPr>
+            <a:stCxn id="28" idx="2"/>
+            <a:endCxn id="35" idx="0"/>
+          </p:cNvCxnSpPr>
+          <p:nvPr/>
+        </p:nvCxnSpPr>
+        <p:spPr>
+          <a:xfrm>
+            <a:off x="2282422" y="1350826"/>
+            <a:ext cx="36909" cy="476289"/>
+          </a:xfrm>
+          <a:prstGeom prst="straightConnector1">
+            <a:avLst/>
+          </a:prstGeom>
+          <a:ln>
+            <a:tailEnd type="triangle"/>
+          </a:ln>
+        </p:spPr>
+        <p:style>
+          <a:lnRef idx="1">
+            <a:schemeClr val="accent1"/>
+          </a:lnRef>
+          <a:fillRef idx="0">
+            <a:schemeClr val="accent1"/>
+          </a:fillRef>
+          <a:effectRef idx="0">
+            <a:schemeClr val="accent1"/>
+          </a:effectRef>
+          <a:fontRef idx="minor">
+            <a:schemeClr val="tx1"/>
+          </a:fontRef>
+        </p:style>
+      </p:cxnSp>
+      <p:sp>
+        <p:nvSpPr>
+          <p:cNvPr id="34" name="Diamond 33"/>
+          <p:cNvSpPr/>
+          <p:nvPr/>
+        </p:nvSpPr>
+        <p:spPr>
+          <a:xfrm>
+            <a:off x="4729469" y="4059403"/>
+            <a:ext cx="1256994" cy="914400"/>
+          </a:xfrm>
+          <a:prstGeom prst="diamond">
+            <a:avLst/>
+          </a:prstGeom>
+        </p:spPr>
+        <p:style>
+          <a:lnRef idx="2">
+            <a:schemeClr val="accent1">
+              <a:shade val="50000"/>
+            </a:schemeClr>
+          </a:lnRef>
+          <a:fillRef idx="1">
+            <a:schemeClr val="accent1"/>
+          </a:fillRef>
+          <a:effectRef idx="0">
+            <a:schemeClr val="accent1"/>
+          </a:effectRef>
+          <a:fontRef idx="minor">
+            <a:schemeClr val="lt1"/>
+          </a:fontRef>
+        </p:style>
+        <p:txBody>
+          <a:bodyPr rtlCol="0" anchor="ctr"/>
+          <a:lstStyle/>
+          <a:p>
+            <a:pPr algn="ctr"/>
+            <a:r>
+              <a:rPr lang="en-US" sz="1200" dirty="0" err="1" smtClean="0"/>
+              <a:t>Config</a:t>
+            </a:r>
+            <a:r>
+              <a:rPr lang="en-US" sz="1200" dirty="0" smtClean="0"/>
+              <a:t> Server</a:t>
+            </a:r>
+            <a:endParaRPr lang="en-US" sz="1200" dirty="0"/>
+          </a:p>
+        </p:txBody>
+      </p:sp>
+    </p:spTree>
+    <p:extLst>
+      <p:ext uri="{BB962C8B-B14F-4D97-AF65-F5344CB8AC3E}">
+        <p14:creationId xmlns:p14="http://schemas.microsoft.com/office/powerpoint/2010/main" val="1092859279"/>
       </p:ext>
     </p:extLst>
   </p:cSld>

</xml_diff>